<commit_message>
[refactor] - To add different OS path
</commit_message>
<xml_diff>
--- a/Jira/PPT/jira_npi.pptx
+++ b/Jira/PPT/jira_npi.pptx
@@ -3108,7 +3108,7 @@
           <a:lstStyle/>
           <a:p>
             <a:r>
-              <a:t>GIGABYTE FO27Q2_2024Sun Apr  7 15:33:18 2024</a:t>
+              <a:t>GIGABYTE FO27Q2_2024Sun Apr  7 15:36:29 2024</a:t>
             </a:r>
           </a:p>
         </p:txBody>
@@ -3374,7 +3374,7 @@
           <a:lstStyle/>
           <a:p>
             <a:r>
-              <a:t>ASUS XG32WCMS_CSOT_2024Sun Apr  7 15:33:18 2024</a:t>
+              <a:t>ASUS XG32WCMS_CSOT_2024Sun Apr  7 15:36:29 2024</a:t>
             </a:r>
           </a:p>
         </p:txBody>
@@ -3640,7 +3640,7 @@
           <a:lstStyle/>
           <a:p>
             <a:r>
-              <a:t>ASUS_XG32WCS-CSOT-2024Sun Apr  7 15:33:18 2024</a:t>
+              <a:t>ASUS_XG32WCS-CSOT-2024Sun Apr  7 15:36:29 2024</a:t>
             </a:r>
           </a:p>
         </p:txBody>
@@ -3906,7 +3906,7 @@
           <a:lstStyle/>
           <a:p>
             <a:r>
-              <a:t>GIGABYTE M27UA_AUO_2024Sun Apr  7 15:33:18 2024</a:t>
+              <a:t>GIGABYTE M27UA_AUO_2024Sun Apr  7 15:36:29 2024</a:t>
             </a:r>
           </a:p>
         </p:txBody>
@@ -4172,7 +4172,7 @@
           <a:lstStyle/>
           <a:p>
             <a:r>
-              <a:t>GIGABYTE M27QA_BOE_2024Sun Apr  7 15:33:18 2024</a:t>
+              <a:t>GIGABYTE M27QA_BOE_2024Sun Apr  7 15:36:29 2024</a:t>
             </a:r>
           </a:p>
         </p:txBody>

</xml_diff>

<commit_message>
[parameter] - To update project setting
</commit_message>
<xml_diff>
--- a/Jira/PPT/jira_npi.pptx
+++ b/Jira/PPT/jira_npi.pptx
@@ -8,8 +8,6 @@
     <p:sldId id="256" r:id="rId7"/>
     <p:sldId id="257" r:id="rId8"/>
     <p:sldId id="258" r:id="rId9"/>
-    <p:sldId id="259" r:id="rId10"/>
-    <p:sldId id="260" r:id="rId11"/>
   </p:sldIdLst>
   <p:sldSz cx="9144000" cy="6858000" type="screen4x3"/>
   <p:notesSz cx="6858000" cy="9144000"/>
@@ -3108,7 +3106,7 @@
           <a:lstStyle/>
           <a:p>
             <a:r>
-              <a:t>GIGABYTE FO27Q2_2024Sun Apr  7 15:36:29 2024</a:t>
+              <a:t>GIGABYTE_MO27U2Tue Nov  5 17:24:13 2024</a:t>
             </a:r>
           </a:p>
         </p:txBody>
@@ -3123,7 +3121,7 @@
         </p:nvGraphicFramePr>
         <p:xfrm>
           <a:off x="914400" y="1828800"/>
-          <a:ext cx="7680960" cy="731520"/>
+          <a:ext cx="5486400" cy="365760"/>
         </p:xfrm>
         <a:graphic>
           <a:graphicData uri="http://schemas.openxmlformats.org/drawingml/2006/table">
@@ -3132,21 +3130,22 @@
                 <a:tableStyleId>{5C22544A-7EE6-4342-B048-85BDC9FD1C3A}</a:tableStyleId>
               </a:tblPr>
               <a:tblGrid>
-                <a:gridCol w="1097280"/>
-                <a:gridCol w="1097280"/>
-                <a:gridCol w="1097280"/>
-                <a:gridCol w="1097280"/>
-                <a:gridCol w="1097280"/>
-                <a:gridCol w="1097280"/>
-                <a:gridCol w="1097280"/>
+                <a:gridCol w="822960"/>
+                <a:gridCol w="822960"/>
+                <a:gridCol w="822960"/>
+                <a:gridCol w="822960"/>
+                <a:gridCol w="914400"/>
+                <a:gridCol w="731520"/>
+                <a:gridCol w="548640"/>
               </a:tblGrid>
-              <a:tr h="365760">
+              <a:tr h="182880">
                 <a:tc>
                   <a:txBody>
                     <a:bodyPr/>
                     <a:lstStyle/>
                     <a:p>
                       <a:r>
+                        <a:rPr sz="1200"/>
                         <a:t>OSD 操作介面</a:t>
                       </a:r>
                     </a:p>
@@ -3159,6 +3158,7 @@
                     <a:lstStyle/>
                     <a:p>
                       <a:r>
+                        <a:rPr sz="1200"/>
                         <a:t>SYS 系統行為</a:t>
                       </a:r>
                     </a:p>
@@ -3171,6 +3171,7 @@
                     <a:lstStyle/>
                     <a:p>
                       <a:r>
+                        <a:rPr sz="1200"/>
                         <a:t>Audio 爆音異音</a:t>
                       </a:r>
                     </a:p>
@@ -3183,6 +3184,7 @@
                     <a:lstStyle/>
                     <a:p>
                       <a:r>
+                        <a:rPr sz="1200"/>
                         <a:t>PQ 畫質相關</a:t>
                       </a:r>
                     </a:p>
@@ -3195,6 +3197,7 @@
                     <a:lstStyle/>
                     <a:p>
                       <a:r>
+                        <a:rPr sz="1200"/>
                         <a:t>Video 畫異、閃屏</a:t>
                       </a:r>
                     </a:p>
@@ -3207,6 +3210,7 @@
                     <a:lstStyle/>
                     <a:p>
                       <a:r>
+                        <a:rPr sz="1200"/>
                         <a:t>待處理</a:t>
                       </a:r>
                     </a:p>
@@ -3219,6 +3223,7 @@
                     <a:lstStyle/>
                     <a:p>
                       <a:r>
+                        <a:rPr sz="1200"/>
                         <a:t>Total</a:t>
                       </a:r>
                     </a:p>
@@ -3226,14 +3231,15 @@
                   <a:tcPr/>
                 </a:tc>
               </a:tr>
-              <a:tr h="365760">
+              <a:tr h="182880">
                 <a:tc>
                   <a:txBody>
                     <a:bodyPr/>
                     <a:lstStyle/>
                     <a:p>
                       <a:r>
-                        <a:t>10</a:t>
+                        <a:rPr sz="1200"/>
+                        <a:t>0</a:t>
                       </a:r>
                     </a:p>
                   </a:txBody>
@@ -3245,7 +3251,8 @@
                     <a:lstStyle/>
                     <a:p>
                       <a:r>
-                        <a:t>10</a:t>
+                        <a:rPr sz="1200"/>
+                        <a:t>0</a:t>
                       </a:r>
                     </a:p>
                   </a:txBody>
@@ -3257,6 +3264,46 @@
                     <a:lstStyle/>
                     <a:p>
                       <a:r>
+                        <a:rPr sz="1200"/>
+                        <a:t>0</a:t>
+                      </a:r>
+                    </a:p>
+                  </a:txBody>
+                  <a:tcPr/>
+                </a:tc>
+                <a:tc>
+                  <a:txBody>
+                    <a:bodyPr/>
+                    <a:lstStyle/>
+                    <a:p>
+                      <a:r>
+                        <a:rPr sz="1200"/>
+                        <a:t>0</a:t>
+                      </a:r>
+                    </a:p>
+                  </a:txBody>
+                  <a:tcPr/>
+                </a:tc>
+                <a:tc>
+                  <a:txBody>
+                    <a:bodyPr/>
+                    <a:lstStyle/>
+                    <a:p>
+                      <a:r>
+                        <a:rPr sz="1200"/>
+                        <a:t>1</a:t>
+                      </a:r>
+                    </a:p>
+                  </a:txBody>
+                  <a:tcPr/>
+                </a:tc>
+                <a:tc>
+                  <a:txBody>
+                    <a:bodyPr/>
+                    <a:lstStyle/>
+                    <a:p>
+                      <a:r>
+                        <a:rPr sz="1200"/>
                         <a:t>2</a:t>
                       </a:r>
                     </a:p>
@@ -3269,43 +3316,8 @@
                     <a:lstStyle/>
                     <a:p>
                       <a:r>
-                        <a:t>0</a:t>
-                      </a:r>
-                    </a:p>
-                  </a:txBody>
-                  <a:tcPr/>
-                </a:tc>
-                <a:tc>
-                  <a:txBody>
-                    <a:bodyPr/>
-                    <a:lstStyle/>
-                    <a:p>
-                      <a:r>
+                        <a:rPr sz="1200"/>
                         <a:t>3</a:t>
-                      </a:r>
-                    </a:p>
-                  </a:txBody>
-                  <a:tcPr/>
-                </a:tc>
-                <a:tc>
-                  <a:txBody>
-                    <a:bodyPr/>
-                    <a:lstStyle/>
-                    <a:p>
-                      <a:r>
-                        <a:t>2</a:t>
-                      </a:r>
-                    </a:p>
-                  </a:txBody>
-                  <a:tcPr/>
-                </a:tc>
-                <a:tc>
-                  <a:txBody>
-                    <a:bodyPr/>
-                    <a:lstStyle/>
-                    <a:p>
-                      <a:r>
-                        <a:t>27</a:t>
                       </a:r>
                     </a:p>
                   </a:txBody>
@@ -3318,7 +3330,7 @@
       </p:graphicFrame>
       <p:pic>
         <p:nvPicPr>
-          <p:cNvPr id="4" name="Picture 3" descr="GIGABYTE FO27Q2_2024.png"/>
+          <p:cNvPr id="4" name="Picture 3" descr="GIGABYTE_MO27U2.png"/>
           <p:cNvPicPr>
             <a:picLocks noChangeAspect="1"/>
           </p:cNvPicPr>
@@ -3374,7 +3386,7 @@
           <a:lstStyle/>
           <a:p>
             <a:r>
-              <a:t>ASUS XG32WCMS_CSOT_2024Sun Apr  7 15:36:29 2024</a:t>
+              <a:t>ASUS_EGG_UHD240_DP2.1Tue Nov  5 17:24:13 2024</a:t>
             </a:r>
           </a:p>
         </p:txBody>
@@ -3389,7 +3401,7 @@
         </p:nvGraphicFramePr>
         <p:xfrm>
           <a:off x="914400" y="1828800"/>
-          <a:ext cx="7680960" cy="731520"/>
+          <a:ext cx="5486400" cy="365760"/>
         </p:xfrm>
         <a:graphic>
           <a:graphicData uri="http://schemas.openxmlformats.org/drawingml/2006/table">
@@ -3398,21 +3410,22 @@
                 <a:tableStyleId>{5C22544A-7EE6-4342-B048-85BDC9FD1C3A}</a:tableStyleId>
               </a:tblPr>
               <a:tblGrid>
-                <a:gridCol w="1097280"/>
-                <a:gridCol w="1097280"/>
-                <a:gridCol w="1097280"/>
-                <a:gridCol w="1097280"/>
-                <a:gridCol w="1097280"/>
-                <a:gridCol w="1097280"/>
-                <a:gridCol w="1097280"/>
+                <a:gridCol w="822960"/>
+                <a:gridCol w="822960"/>
+                <a:gridCol w="822960"/>
+                <a:gridCol w="822960"/>
+                <a:gridCol w="914400"/>
+                <a:gridCol w="731520"/>
+                <a:gridCol w="548640"/>
               </a:tblGrid>
-              <a:tr h="365760">
+              <a:tr h="182880">
                 <a:tc>
                   <a:txBody>
                     <a:bodyPr/>
                     <a:lstStyle/>
                     <a:p>
                       <a:r>
+                        <a:rPr sz="1200"/>
                         <a:t>OSD 操作介面</a:t>
                       </a:r>
                     </a:p>
@@ -3425,6 +3438,7 @@
                     <a:lstStyle/>
                     <a:p>
                       <a:r>
+                        <a:rPr sz="1200"/>
                         <a:t>SYS 系統行為</a:t>
                       </a:r>
                     </a:p>
@@ -3437,6 +3451,7 @@
                     <a:lstStyle/>
                     <a:p>
                       <a:r>
+                        <a:rPr sz="1200"/>
                         <a:t>Audio 爆音異音</a:t>
                       </a:r>
                     </a:p>
@@ -3449,6 +3464,7 @@
                     <a:lstStyle/>
                     <a:p>
                       <a:r>
+                        <a:rPr sz="1200"/>
                         <a:t>PQ 畫質相關</a:t>
                       </a:r>
                     </a:p>
@@ -3461,6 +3477,7 @@
                     <a:lstStyle/>
                     <a:p>
                       <a:r>
+                        <a:rPr sz="1200"/>
                         <a:t>Video 畫異、閃屏</a:t>
                       </a:r>
                     </a:p>
@@ -3473,6 +3490,7 @@
                     <a:lstStyle/>
                     <a:p>
                       <a:r>
+                        <a:rPr sz="1200"/>
                         <a:t>待處理</a:t>
                       </a:r>
                     </a:p>
@@ -3485,6 +3503,7 @@
                     <a:lstStyle/>
                     <a:p>
                       <a:r>
+                        <a:rPr sz="1200"/>
                         <a:t>Total</a:t>
                       </a:r>
                     </a:p>
@@ -3492,14 +3511,15 @@
                   <a:tcPr/>
                 </a:tc>
               </a:tr>
-              <a:tr h="365760">
+              <a:tr h="182880">
                 <a:tc>
                   <a:txBody>
                     <a:bodyPr/>
                     <a:lstStyle/>
                     <a:p>
                       <a:r>
-                        <a:t>12</a:t>
+                        <a:rPr sz="1200"/>
+                        <a:t>27</a:t>
                       </a:r>
                     </a:p>
                   </a:txBody>
@@ -3511,7 +3531,8 @@
                     <a:lstStyle/>
                     <a:p>
                       <a:r>
-                        <a:t>35</a:t>
+                        <a:rPr sz="1200"/>
+                        <a:t>49</a:t>
                       </a:r>
                     </a:p>
                   </a:txBody>
@@ -3523,7 +3544,8 @@
                     <a:lstStyle/>
                     <a:p>
                       <a:r>
-                        <a:t>1</a:t>
+                        <a:rPr sz="1200"/>
+                        <a:t>0</a:t>
                       </a:r>
                     </a:p>
                   </a:txBody>
@@ -3535,7 +3557,8 @@
                     <a:lstStyle/>
                     <a:p>
                       <a:r>
-                        <a:t>1</a:t>
+                        <a:rPr sz="1200"/>
+                        <a:t>5</a:t>
                       </a:r>
                     </a:p>
                   </a:txBody>
@@ -3547,7 +3570,8 @@
                     <a:lstStyle/>
                     <a:p>
                       <a:r>
-                        <a:t>14</a:t>
+                        <a:rPr sz="1200"/>
+                        <a:t>9</a:t>
                       </a:r>
                     </a:p>
                   </a:txBody>
@@ -3559,6 +3583,7 @@
                     <a:lstStyle/>
                     <a:p>
                       <a:r>
+                        <a:rPr sz="1200"/>
                         <a:t>4</a:t>
                       </a:r>
                     </a:p>
@@ -3571,7 +3596,8 @@
                     <a:lstStyle/>
                     <a:p>
                       <a:r>
-                        <a:t>67</a:t>
+                        <a:rPr sz="1200"/>
+                        <a:t>94</a:t>
                       </a:r>
                     </a:p>
                   </a:txBody>
@@ -3584,7 +3610,7 @@
       </p:graphicFrame>
       <p:pic>
         <p:nvPicPr>
-          <p:cNvPr id="4" name="Picture 3" descr="ASUS XG32WCMS_CSOT_2024.png"/>
+          <p:cNvPr id="4" name="Picture 3" descr="ASUS_EGG_UHD240_DP2.1.png"/>
           <p:cNvPicPr>
             <a:picLocks noChangeAspect="1"/>
           </p:cNvPicPr>
@@ -3640,7 +3666,7 @@
           <a:lstStyle/>
           <a:p>
             <a:r>
-              <a:t>ASUS_XG32WCS-CSOT-2024Sun Apr  7 15:36:29 2024</a:t>
+              <a:t>ASUS_Stone_UHD240Tue Nov  5 17:24:13 2024</a:t>
             </a:r>
           </a:p>
         </p:txBody>
@@ -3655,7 +3681,7 @@
         </p:nvGraphicFramePr>
         <p:xfrm>
           <a:off x="914400" y="1828800"/>
-          <a:ext cx="7680960" cy="731520"/>
+          <a:ext cx="5486400" cy="365760"/>
         </p:xfrm>
         <a:graphic>
           <a:graphicData uri="http://schemas.openxmlformats.org/drawingml/2006/table">
@@ -3664,21 +3690,22 @@
                 <a:tableStyleId>{5C22544A-7EE6-4342-B048-85BDC9FD1C3A}</a:tableStyleId>
               </a:tblPr>
               <a:tblGrid>
-                <a:gridCol w="1097280"/>
-                <a:gridCol w="1097280"/>
-                <a:gridCol w="1097280"/>
-                <a:gridCol w="1097280"/>
-                <a:gridCol w="1097280"/>
-                <a:gridCol w="1097280"/>
-                <a:gridCol w="1097280"/>
+                <a:gridCol w="822960"/>
+                <a:gridCol w="822960"/>
+                <a:gridCol w="822960"/>
+                <a:gridCol w="822960"/>
+                <a:gridCol w="914400"/>
+                <a:gridCol w="731520"/>
+                <a:gridCol w="548640"/>
               </a:tblGrid>
-              <a:tr h="365760">
+              <a:tr h="182880">
                 <a:tc>
                   <a:txBody>
                     <a:bodyPr/>
                     <a:lstStyle/>
                     <a:p>
                       <a:r>
+                        <a:rPr sz="1200"/>
                         <a:t>OSD 操作介面</a:t>
                       </a:r>
                     </a:p>
@@ -3691,6 +3718,7 @@
                     <a:lstStyle/>
                     <a:p>
                       <a:r>
+                        <a:rPr sz="1200"/>
                         <a:t>SYS 系統行為</a:t>
                       </a:r>
                     </a:p>
@@ -3703,6 +3731,7 @@
                     <a:lstStyle/>
                     <a:p>
                       <a:r>
+                        <a:rPr sz="1200"/>
                         <a:t>Audio 爆音異音</a:t>
                       </a:r>
                     </a:p>
@@ -3715,6 +3744,7 @@
                     <a:lstStyle/>
                     <a:p>
                       <a:r>
+                        <a:rPr sz="1200"/>
                         <a:t>PQ 畫質相關</a:t>
                       </a:r>
                     </a:p>
@@ -3727,6 +3757,7 @@
                     <a:lstStyle/>
                     <a:p>
                       <a:r>
+                        <a:rPr sz="1200"/>
                         <a:t>Video 畫異、閃屏</a:t>
                       </a:r>
                     </a:p>
@@ -3739,6 +3770,7 @@
                     <a:lstStyle/>
                     <a:p>
                       <a:r>
+                        <a:rPr sz="1200"/>
                         <a:t>待處理</a:t>
                       </a:r>
                     </a:p>
@@ -3751,6 +3783,7 @@
                     <a:lstStyle/>
                     <a:p>
                       <a:r>
+                        <a:rPr sz="1200"/>
                         <a:t>Total</a:t>
                       </a:r>
                     </a:p>
@@ -3758,14 +3791,15 @@
                   <a:tcPr/>
                 </a:tc>
               </a:tr>
-              <a:tr h="365760">
+              <a:tr h="182880">
                 <a:tc>
                   <a:txBody>
                     <a:bodyPr/>
                     <a:lstStyle/>
                     <a:p>
                       <a:r>
-                        <a:t>5</a:t>
+                        <a:rPr sz="1200"/>
+                        <a:t>19</a:t>
                       </a:r>
                     </a:p>
                   </a:txBody>
@@ -3777,7 +3811,8 @@
                     <a:lstStyle/>
                     <a:p>
                       <a:r>
-                        <a:t>15</a:t>
+                        <a:rPr sz="1200"/>
+                        <a:t>29</a:t>
                       </a:r>
                     </a:p>
                   </a:txBody>
@@ -3789,6 +3824,7 @@
                     <a:lstStyle/>
                     <a:p>
                       <a:r>
+                        <a:rPr sz="1200"/>
                         <a:t>0</a:t>
                       </a:r>
                     </a:p>
@@ -3801,6 +3837,33 @@
                     <a:lstStyle/>
                     <a:p>
                       <a:r>
+                        <a:rPr sz="1200"/>
+                        <a:t>4</a:t>
+                      </a:r>
+                    </a:p>
+                  </a:txBody>
+                  <a:tcPr/>
+                </a:tc>
+                <a:tc>
+                  <a:txBody>
+                    <a:bodyPr/>
+                    <a:lstStyle/>
+                    <a:p>
+                      <a:r>
+                        <a:rPr sz="1200"/>
+                        <a:t>7</a:t>
+                      </a:r>
+                    </a:p>
+                  </a:txBody>
+                  <a:tcPr/>
+                </a:tc>
+                <a:tc>
+                  <a:txBody>
+                    <a:bodyPr/>
+                    <a:lstStyle/>
+                    <a:p>
+                      <a:r>
+                        <a:rPr sz="1200"/>
                         <a:t>0</a:t>
                       </a:r>
                     </a:p>
@@ -3813,31 +3876,8 @@
                     <a:lstStyle/>
                     <a:p>
                       <a:r>
-                        <a:t>3</a:t>
-                      </a:r>
-                    </a:p>
-                  </a:txBody>
-                  <a:tcPr/>
-                </a:tc>
-                <a:tc>
-                  <a:txBody>
-                    <a:bodyPr/>
-                    <a:lstStyle/>
-                    <a:p>
-                      <a:r>
-                        <a:t>3</a:t>
-                      </a:r>
-                    </a:p>
-                  </a:txBody>
-                  <a:tcPr/>
-                </a:tc>
-                <a:tc>
-                  <a:txBody>
-                    <a:bodyPr/>
-                    <a:lstStyle/>
-                    <a:p>
-                      <a:r>
-                        <a:t>26</a:t>
+                        <a:rPr sz="1200"/>
+                        <a:t>59</a:t>
                       </a:r>
                     </a:p>
                   </a:txBody>
@@ -3850,539 +3890,7 @@
       </p:graphicFrame>
       <p:pic>
         <p:nvPicPr>
-          <p:cNvPr id="4" name="Picture 3" descr="ASUS_XG32WCS-CSOT-2024.png"/>
-          <p:cNvPicPr>
-            <a:picLocks noChangeAspect="1"/>
-          </p:cNvPicPr>
-          <p:nvPr/>
-        </p:nvPicPr>
-        <p:blipFill>
-          <a:blip r:embed="rId2"/>
-          <a:stretch>
-            <a:fillRect/>
-          </a:stretch>
-        </p:blipFill>
-        <p:spPr>
-          <a:xfrm>
-            <a:off x="2743200" y="3657600"/>
-            <a:ext cx="4572000" cy="2857500"/>
-          </a:xfrm>
-          <a:prstGeom prst="rect">
-            <a:avLst/>
-          </a:prstGeom>
-        </p:spPr>
-      </p:pic>
-    </p:spTree>
-  </p:cSld>
-  <p:clrMapOvr>
-    <a:masterClrMapping/>
-  </p:clrMapOvr>
-</p:sld>
-</file>
-
-<file path=ppt/slides/slide4.xml><?xml version="1.0" encoding="utf-8"?>
-<p:sld xmlns:a="http://schemas.openxmlformats.org/drawingml/2006/main" xmlns:p="http://schemas.openxmlformats.org/presentationml/2006/main" xmlns:r="http://schemas.openxmlformats.org/officeDocument/2006/relationships">
-  <p:cSld>
-    <p:spTree>
-      <p:nvGrpSpPr>
-        <p:cNvPr id="1" name=""/>
-        <p:cNvGrpSpPr/>
-        <p:nvPr/>
-      </p:nvGrpSpPr>
-      <p:grpSpPr/>
-      <p:sp>
-        <p:nvSpPr>
-          <p:cNvPr id="2" name="Title 1"/>
-          <p:cNvSpPr>
-            <a:spLocks noGrp="1"/>
-          </p:cNvSpPr>
-          <p:nvPr>
-            <p:ph type="title"/>
-          </p:nvPr>
-        </p:nvSpPr>
-        <p:spPr/>
-        <p:txBody>
-          <a:bodyPr/>
-          <a:lstStyle/>
-          <a:p>
-            <a:r>
-              <a:t>GIGABYTE M27UA_AUO_2024Sun Apr  7 15:36:29 2024</a:t>
-            </a:r>
-          </a:p>
-        </p:txBody>
-      </p:sp>
-      <p:graphicFrame>
-        <p:nvGraphicFramePr>
-          <p:cNvPr id="3" name="Table 2"/>
-          <p:cNvGraphicFramePr>
-            <a:graphicFrameLocks noGrp="1"/>
-          </p:cNvGraphicFramePr>
-          <p:nvPr/>
-        </p:nvGraphicFramePr>
-        <p:xfrm>
-          <a:off x="914400" y="1828800"/>
-          <a:ext cx="7680960" cy="731520"/>
-        </p:xfrm>
-        <a:graphic>
-          <a:graphicData uri="http://schemas.openxmlformats.org/drawingml/2006/table">
-            <a:tbl>
-              <a:tblPr firstRow="1" bandRow="1">
-                <a:tableStyleId>{5C22544A-7EE6-4342-B048-85BDC9FD1C3A}</a:tableStyleId>
-              </a:tblPr>
-              <a:tblGrid>
-                <a:gridCol w="1097280"/>
-                <a:gridCol w="1097280"/>
-                <a:gridCol w="1097280"/>
-                <a:gridCol w="1097280"/>
-                <a:gridCol w="1097280"/>
-                <a:gridCol w="1097280"/>
-                <a:gridCol w="1097280"/>
-              </a:tblGrid>
-              <a:tr h="365760">
-                <a:tc>
-                  <a:txBody>
-                    <a:bodyPr/>
-                    <a:lstStyle/>
-                    <a:p>
-                      <a:r>
-                        <a:t>OSD 操作介面</a:t>
-                      </a:r>
-                    </a:p>
-                  </a:txBody>
-                  <a:tcPr/>
-                </a:tc>
-                <a:tc>
-                  <a:txBody>
-                    <a:bodyPr/>
-                    <a:lstStyle/>
-                    <a:p>
-                      <a:r>
-                        <a:t>SYS 系統行為</a:t>
-                      </a:r>
-                    </a:p>
-                  </a:txBody>
-                  <a:tcPr/>
-                </a:tc>
-                <a:tc>
-                  <a:txBody>
-                    <a:bodyPr/>
-                    <a:lstStyle/>
-                    <a:p>
-                      <a:r>
-                        <a:t>Audio 爆音異音</a:t>
-                      </a:r>
-                    </a:p>
-                  </a:txBody>
-                  <a:tcPr/>
-                </a:tc>
-                <a:tc>
-                  <a:txBody>
-                    <a:bodyPr/>
-                    <a:lstStyle/>
-                    <a:p>
-                      <a:r>
-                        <a:t>PQ 畫質相關</a:t>
-                      </a:r>
-                    </a:p>
-                  </a:txBody>
-                  <a:tcPr/>
-                </a:tc>
-                <a:tc>
-                  <a:txBody>
-                    <a:bodyPr/>
-                    <a:lstStyle/>
-                    <a:p>
-                      <a:r>
-                        <a:t>Video 畫異、閃屏</a:t>
-                      </a:r>
-                    </a:p>
-                  </a:txBody>
-                  <a:tcPr/>
-                </a:tc>
-                <a:tc>
-                  <a:txBody>
-                    <a:bodyPr/>
-                    <a:lstStyle/>
-                    <a:p>
-                      <a:r>
-                        <a:t>待處理</a:t>
-                      </a:r>
-                    </a:p>
-                  </a:txBody>
-                  <a:tcPr/>
-                </a:tc>
-                <a:tc>
-                  <a:txBody>
-                    <a:bodyPr/>
-                    <a:lstStyle/>
-                    <a:p>
-                      <a:r>
-                        <a:t>Total</a:t>
-                      </a:r>
-                    </a:p>
-                  </a:txBody>
-                  <a:tcPr/>
-                </a:tc>
-              </a:tr>
-              <a:tr h="365760">
-                <a:tc>
-                  <a:txBody>
-                    <a:bodyPr/>
-                    <a:lstStyle/>
-                    <a:p>
-                      <a:r>
-                        <a:t>2</a:t>
-                      </a:r>
-                    </a:p>
-                  </a:txBody>
-                  <a:tcPr/>
-                </a:tc>
-                <a:tc>
-                  <a:txBody>
-                    <a:bodyPr/>
-                    <a:lstStyle/>
-                    <a:p>
-                      <a:r>
-                        <a:t>7</a:t>
-                      </a:r>
-                    </a:p>
-                  </a:txBody>
-                  <a:tcPr/>
-                </a:tc>
-                <a:tc>
-                  <a:txBody>
-                    <a:bodyPr/>
-                    <a:lstStyle/>
-                    <a:p>
-                      <a:r>
-                        <a:t>1</a:t>
-                      </a:r>
-                    </a:p>
-                  </a:txBody>
-                  <a:tcPr/>
-                </a:tc>
-                <a:tc>
-                  <a:txBody>
-                    <a:bodyPr/>
-                    <a:lstStyle/>
-                    <a:p>
-                      <a:r>
-                        <a:t>3</a:t>
-                      </a:r>
-                    </a:p>
-                  </a:txBody>
-                  <a:tcPr/>
-                </a:tc>
-                <a:tc>
-                  <a:txBody>
-                    <a:bodyPr/>
-                    <a:lstStyle/>
-                    <a:p>
-                      <a:r>
-                        <a:t>9</a:t>
-                      </a:r>
-                    </a:p>
-                  </a:txBody>
-                  <a:tcPr/>
-                </a:tc>
-                <a:tc>
-                  <a:txBody>
-                    <a:bodyPr/>
-                    <a:lstStyle/>
-                    <a:p>
-                      <a:r>
-                        <a:t>0</a:t>
-                      </a:r>
-                    </a:p>
-                  </a:txBody>
-                  <a:tcPr/>
-                </a:tc>
-                <a:tc>
-                  <a:txBody>
-                    <a:bodyPr/>
-                    <a:lstStyle/>
-                    <a:p>
-                      <a:r>
-                        <a:t>22</a:t>
-                      </a:r>
-                    </a:p>
-                  </a:txBody>
-                  <a:tcPr/>
-                </a:tc>
-              </a:tr>
-            </a:tbl>
-          </a:graphicData>
-        </a:graphic>
-      </p:graphicFrame>
-      <p:pic>
-        <p:nvPicPr>
-          <p:cNvPr id="4" name="Picture 3" descr="GIGABYTE M27UA_AUO_2024.png"/>
-          <p:cNvPicPr>
-            <a:picLocks noChangeAspect="1"/>
-          </p:cNvPicPr>
-          <p:nvPr/>
-        </p:nvPicPr>
-        <p:blipFill>
-          <a:blip r:embed="rId2"/>
-          <a:stretch>
-            <a:fillRect/>
-          </a:stretch>
-        </p:blipFill>
-        <p:spPr>
-          <a:xfrm>
-            <a:off x="2743200" y="3657600"/>
-            <a:ext cx="4572000" cy="2857500"/>
-          </a:xfrm>
-          <a:prstGeom prst="rect">
-            <a:avLst/>
-          </a:prstGeom>
-        </p:spPr>
-      </p:pic>
-    </p:spTree>
-  </p:cSld>
-  <p:clrMapOvr>
-    <a:masterClrMapping/>
-  </p:clrMapOvr>
-</p:sld>
-</file>
-
-<file path=ppt/slides/slide5.xml><?xml version="1.0" encoding="utf-8"?>
-<p:sld xmlns:a="http://schemas.openxmlformats.org/drawingml/2006/main" xmlns:p="http://schemas.openxmlformats.org/presentationml/2006/main" xmlns:r="http://schemas.openxmlformats.org/officeDocument/2006/relationships">
-  <p:cSld>
-    <p:spTree>
-      <p:nvGrpSpPr>
-        <p:cNvPr id="1" name=""/>
-        <p:cNvGrpSpPr/>
-        <p:nvPr/>
-      </p:nvGrpSpPr>
-      <p:grpSpPr/>
-      <p:sp>
-        <p:nvSpPr>
-          <p:cNvPr id="2" name="Title 1"/>
-          <p:cNvSpPr>
-            <a:spLocks noGrp="1"/>
-          </p:cNvSpPr>
-          <p:nvPr>
-            <p:ph type="title"/>
-          </p:nvPr>
-        </p:nvSpPr>
-        <p:spPr/>
-        <p:txBody>
-          <a:bodyPr/>
-          <a:lstStyle/>
-          <a:p>
-            <a:r>
-              <a:t>GIGABYTE M27QA_BOE_2024Sun Apr  7 15:36:29 2024</a:t>
-            </a:r>
-          </a:p>
-        </p:txBody>
-      </p:sp>
-      <p:graphicFrame>
-        <p:nvGraphicFramePr>
-          <p:cNvPr id="3" name="Table 2"/>
-          <p:cNvGraphicFramePr>
-            <a:graphicFrameLocks noGrp="1"/>
-          </p:cNvGraphicFramePr>
-          <p:nvPr/>
-        </p:nvGraphicFramePr>
-        <p:xfrm>
-          <a:off x="914400" y="1828800"/>
-          <a:ext cx="7680960" cy="731520"/>
-        </p:xfrm>
-        <a:graphic>
-          <a:graphicData uri="http://schemas.openxmlformats.org/drawingml/2006/table">
-            <a:tbl>
-              <a:tblPr firstRow="1" bandRow="1">
-                <a:tableStyleId>{5C22544A-7EE6-4342-B048-85BDC9FD1C3A}</a:tableStyleId>
-              </a:tblPr>
-              <a:tblGrid>
-                <a:gridCol w="1097280"/>
-                <a:gridCol w="1097280"/>
-                <a:gridCol w="1097280"/>
-                <a:gridCol w="1097280"/>
-                <a:gridCol w="1097280"/>
-                <a:gridCol w="1097280"/>
-                <a:gridCol w="1097280"/>
-              </a:tblGrid>
-              <a:tr h="365760">
-                <a:tc>
-                  <a:txBody>
-                    <a:bodyPr/>
-                    <a:lstStyle/>
-                    <a:p>
-                      <a:r>
-                        <a:t>OSD 操作介面</a:t>
-                      </a:r>
-                    </a:p>
-                  </a:txBody>
-                  <a:tcPr/>
-                </a:tc>
-                <a:tc>
-                  <a:txBody>
-                    <a:bodyPr/>
-                    <a:lstStyle/>
-                    <a:p>
-                      <a:r>
-                        <a:t>SYS 系統行為</a:t>
-                      </a:r>
-                    </a:p>
-                  </a:txBody>
-                  <a:tcPr/>
-                </a:tc>
-                <a:tc>
-                  <a:txBody>
-                    <a:bodyPr/>
-                    <a:lstStyle/>
-                    <a:p>
-                      <a:r>
-                        <a:t>Audio 爆音異音</a:t>
-                      </a:r>
-                    </a:p>
-                  </a:txBody>
-                  <a:tcPr/>
-                </a:tc>
-                <a:tc>
-                  <a:txBody>
-                    <a:bodyPr/>
-                    <a:lstStyle/>
-                    <a:p>
-                      <a:r>
-                        <a:t>PQ 畫質相關</a:t>
-                      </a:r>
-                    </a:p>
-                  </a:txBody>
-                  <a:tcPr/>
-                </a:tc>
-                <a:tc>
-                  <a:txBody>
-                    <a:bodyPr/>
-                    <a:lstStyle/>
-                    <a:p>
-                      <a:r>
-                        <a:t>Video 畫異、閃屏</a:t>
-                      </a:r>
-                    </a:p>
-                  </a:txBody>
-                  <a:tcPr/>
-                </a:tc>
-                <a:tc>
-                  <a:txBody>
-                    <a:bodyPr/>
-                    <a:lstStyle/>
-                    <a:p>
-                      <a:r>
-                        <a:t>待處理</a:t>
-                      </a:r>
-                    </a:p>
-                  </a:txBody>
-                  <a:tcPr/>
-                </a:tc>
-                <a:tc>
-                  <a:txBody>
-                    <a:bodyPr/>
-                    <a:lstStyle/>
-                    <a:p>
-                      <a:r>
-                        <a:t>Total</a:t>
-                      </a:r>
-                    </a:p>
-                  </a:txBody>
-                  <a:tcPr/>
-                </a:tc>
-              </a:tr>
-              <a:tr h="365760">
-                <a:tc>
-                  <a:txBody>
-                    <a:bodyPr/>
-                    <a:lstStyle/>
-                    <a:p>
-                      <a:r>
-                        <a:t>2</a:t>
-                      </a:r>
-                    </a:p>
-                  </a:txBody>
-                  <a:tcPr/>
-                </a:tc>
-                <a:tc>
-                  <a:txBody>
-                    <a:bodyPr/>
-                    <a:lstStyle/>
-                    <a:p>
-                      <a:r>
-                        <a:t>1</a:t>
-                      </a:r>
-                    </a:p>
-                  </a:txBody>
-                  <a:tcPr/>
-                </a:tc>
-                <a:tc>
-                  <a:txBody>
-                    <a:bodyPr/>
-                    <a:lstStyle/>
-                    <a:p>
-                      <a:r>
-                        <a:t>0</a:t>
-                      </a:r>
-                    </a:p>
-                  </a:txBody>
-                  <a:tcPr/>
-                </a:tc>
-                <a:tc>
-                  <a:txBody>
-                    <a:bodyPr/>
-                    <a:lstStyle/>
-                    <a:p>
-                      <a:r>
-                        <a:t>1</a:t>
-                      </a:r>
-                    </a:p>
-                  </a:txBody>
-                  <a:tcPr/>
-                </a:tc>
-                <a:tc>
-                  <a:txBody>
-                    <a:bodyPr/>
-                    <a:lstStyle/>
-                    <a:p>
-                      <a:r>
-                        <a:t>0</a:t>
-                      </a:r>
-                    </a:p>
-                  </a:txBody>
-                  <a:tcPr/>
-                </a:tc>
-                <a:tc>
-                  <a:txBody>
-                    <a:bodyPr/>
-                    <a:lstStyle/>
-                    <a:p>
-                      <a:r>
-                        <a:t>0</a:t>
-                      </a:r>
-                    </a:p>
-                  </a:txBody>
-                  <a:tcPr/>
-                </a:tc>
-                <a:tc>
-                  <a:txBody>
-                    <a:bodyPr/>
-                    <a:lstStyle/>
-                    <a:p>
-                      <a:r>
-                        <a:t>4</a:t>
-                      </a:r>
-                    </a:p>
-                  </a:txBody>
-                  <a:tcPr/>
-                </a:tc>
-              </a:tr>
-            </a:tbl>
-          </a:graphicData>
-        </a:graphic>
-      </p:graphicFrame>
-      <p:pic>
-        <p:nvPicPr>
-          <p:cNvPr id="4" name="Picture 3" descr="GIGABYTE M27QA_BOE_2024.png"/>
+          <p:cNvPr id="4" name="Picture 3" descr="ASUS_Stone_UHD240.png"/>
           <p:cNvPicPr>
             <a:picLocks noChangeAspect="1"/>
           </p:cNvPicPr>

</xml_diff>

<commit_message>
[parameter] - To remove MP projects
</commit_message>
<xml_diff>
--- a/Jira/PPT/jira_npi.pptx
+++ b/Jira/PPT/jira_npi.pptx
@@ -8,6 +8,10 @@
     <p:sldId id="256" r:id="rId7"/>
     <p:sldId id="257" r:id="rId8"/>
     <p:sldId id="258" r:id="rId9"/>
+    <p:sldId id="259" r:id="rId10"/>
+    <p:sldId id="260" r:id="rId11"/>
+    <p:sldId id="261" r:id="rId12"/>
+    <p:sldId id="262" r:id="rId13"/>
   </p:sldIdLst>
   <p:sldSz cx="9144000" cy="6858000" type="screen4x3"/>
   <p:notesSz cx="6858000" cy="9144000"/>
@@ -3106,7 +3110,7 @@
           <a:lstStyle/>
           <a:p>
             <a:r>
-              <a:t>GIGABYTE_MO27U2Tue Nov  5 17:24:13 2024</a:t>
+              <a:t>GIGABYTE AORUS FO27Q5PMon Mar 24 10:41:15 2025</a:t>
             </a:r>
           </a:p>
         </p:txBody>
@@ -3239,46 +3243,33 @@
                     <a:p>
                       <a:r>
                         <a:rPr sz="1200"/>
-                        <a:t>0</a:t>
-                      </a:r>
-                    </a:p>
-                  </a:txBody>
-                  <a:tcPr/>
-                </a:tc>
-                <a:tc>
-                  <a:txBody>
-                    <a:bodyPr/>
-                    <a:lstStyle/>
-                    <a:p>
-                      <a:r>
-                        <a:rPr sz="1200"/>
-                        <a:t>0</a:t>
-                      </a:r>
-                    </a:p>
-                  </a:txBody>
-                  <a:tcPr/>
-                </a:tc>
-                <a:tc>
-                  <a:txBody>
-                    <a:bodyPr/>
-                    <a:lstStyle/>
-                    <a:p>
-                      <a:r>
-                        <a:rPr sz="1200"/>
-                        <a:t>0</a:t>
-                      </a:r>
-                    </a:p>
-                  </a:txBody>
-                  <a:tcPr/>
-                </a:tc>
-                <a:tc>
-                  <a:txBody>
-                    <a:bodyPr/>
-                    <a:lstStyle/>
-                    <a:p>
-                      <a:r>
-                        <a:rPr sz="1200"/>
-                        <a:t>0</a:t>
+                        <a:t>40</a:t>
+                      </a:r>
+                    </a:p>
+                  </a:txBody>
+                  <a:tcPr/>
+                </a:tc>
+                <a:tc>
+                  <a:txBody>
+                    <a:bodyPr/>
+                    <a:lstStyle/>
+                    <a:p>
+                      <a:r>
+                        <a:rPr sz="1200"/>
+                        <a:t>32</a:t>
+                      </a:r>
+                    </a:p>
+                  </a:txBody>
+                  <a:tcPr/>
+                </a:tc>
+                <a:tc>
+                  <a:txBody>
+                    <a:bodyPr/>
+                    <a:lstStyle/>
+                    <a:p>
+                      <a:r>
+                        <a:rPr sz="1200"/>
+                        <a:t>5</a:t>
                       </a:r>
                     </a:p>
                   </a:txBody>
@@ -3304,20 +3295,33 @@
                     <a:p>
                       <a:r>
                         <a:rPr sz="1200"/>
-                        <a:t>2</a:t>
-                      </a:r>
-                    </a:p>
-                  </a:txBody>
-                  <a:tcPr/>
-                </a:tc>
-                <a:tc>
-                  <a:txBody>
-                    <a:bodyPr/>
-                    <a:lstStyle/>
-                    <a:p>
-                      <a:r>
-                        <a:rPr sz="1200"/>
                         <a:t>3</a:t>
+                      </a:r>
+                    </a:p>
+                  </a:txBody>
+                  <a:tcPr/>
+                </a:tc>
+                <a:tc>
+                  <a:txBody>
+                    <a:bodyPr/>
+                    <a:lstStyle/>
+                    <a:p>
+                      <a:r>
+                        <a:rPr sz="1200"/>
+                        <a:t>12</a:t>
+                      </a:r>
+                    </a:p>
+                  </a:txBody>
+                  <a:tcPr/>
+                </a:tc>
+                <a:tc>
+                  <a:txBody>
+                    <a:bodyPr/>
+                    <a:lstStyle/>
+                    <a:p>
+                      <a:r>
+                        <a:rPr sz="1200"/>
+                        <a:t>93</a:t>
                       </a:r>
                     </a:p>
                   </a:txBody>
@@ -3330,7 +3334,7 @@
       </p:graphicFrame>
       <p:pic>
         <p:nvPicPr>
-          <p:cNvPr id="4" name="Picture 3" descr="GIGABYTE_MO27U2.png"/>
+          <p:cNvPr id="4" name="Picture 3" descr="GIGABYTE AORUS FO27Q5P.png"/>
           <p:cNvPicPr>
             <a:picLocks noChangeAspect="1"/>
           </p:cNvPicPr>
@@ -3386,7 +3390,7 @@
           <a:lstStyle/>
           <a:p>
             <a:r>
-              <a:t>ASUS_EGG_UHD240_DP2.1Tue Nov  5 17:24:13 2024</a:t>
+              <a:t>ASUS_PG32UCDMR-2025Mon Mar 24 10:41:15 2025</a:t>
             </a:r>
           </a:p>
         </p:txBody>
@@ -3519,32 +3523,6 @@
                     <a:p>
                       <a:r>
                         <a:rPr sz="1200"/>
-                        <a:t>27</a:t>
-                      </a:r>
-                    </a:p>
-                  </a:txBody>
-                  <a:tcPr/>
-                </a:tc>
-                <a:tc>
-                  <a:txBody>
-                    <a:bodyPr/>
-                    <a:lstStyle/>
-                    <a:p>
-                      <a:r>
-                        <a:rPr sz="1200"/>
-                        <a:t>49</a:t>
-                      </a:r>
-                    </a:p>
-                  </a:txBody>
-                  <a:tcPr/>
-                </a:tc>
-                <a:tc>
-                  <a:txBody>
-                    <a:bodyPr/>
-                    <a:lstStyle/>
-                    <a:p>
-                      <a:r>
-                        <a:rPr sz="1200"/>
                         <a:t>0</a:t>
                       </a:r>
                     </a:p>
@@ -3558,46 +3536,72 @@
                     <a:p>
                       <a:r>
                         <a:rPr sz="1200"/>
-                        <a:t>5</a:t>
-                      </a:r>
-                    </a:p>
-                  </a:txBody>
-                  <a:tcPr/>
-                </a:tc>
-                <a:tc>
-                  <a:txBody>
-                    <a:bodyPr/>
-                    <a:lstStyle/>
-                    <a:p>
-                      <a:r>
-                        <a:rPr sz="1200"/>
-                        <a:t>9</a:t>
-                      </a:r>
-                    </a:p>
-                  </a:txBody>
-                  <a:tcPr/>
-                </a:tc>
-                <a:tc>
-                  <a:txBody>
-                    <a:bodyPr/>
-                    <a:lstStyle/>
-                    <a:p>
-                      <a:r>
-                        <a:rPr sz="1200"/>
-                        <a:t>4</a:t>
-                      </a:r>
-                    </a:p>
-                  </a:txBody>
-                  <a:tcPr/>
-                </a:tc>
-                <a:tc>
-                  <a:txBody>
-                    <a:bodyPr/>
-                    <a:lstStyle/>
-                    <a:p>
-                      <a:r>
-                        <a:rPr sz="1200"/>
-                        <a:t>94</a:t>
+                        <a:t>0</a:t>
+                      </a:r>
+                    </a:p>
+                  </a:txBody>
+                  <a:tcPr/>
+                </a:tc>
+                <a:tc>
+                  <a:txBody>
+                    <a:bodyPr/>
+                    <a:lstStyle/>
+                    <a:p>
+                      <a:r>
+                        <a:rPr sz="1200"/>
+                        <a:t>0</a:t>
+                      </a:r>
+                    </a:p>
+                  </a:txBody>
+                  <a:tcPr/>
+                </a:tc>
+                <a:tc>
+                  <a:txBody>
+                    <a:bodyPr/>
+                    <a:lstStyle/>
+                    <a:p>
+                      <a:r>
+                        <a:rPr sz="1200"/>
+                        <a:t>0</a:t>
+                      </a:r>
+                    </a:p>
+                  </a:txBody>
+                  <a:tcPr/>
+                </a:tc>
+                <a:tc>
+                  <a:txBody>
+                    <a:bodyPr/>
+                    <a:lstStyle/>
+                    <a:p>
+                      <a:r>
+                        <a:rPr sz="1200"/>
+                        <a:t>0</a:t>
+                      </a:r>
+                    </a:p>
+                  </a:txBody>
+                  <a:tcPr/>
+                </a:tc>
+                <a:tc>
+                  <a:txBody>
+                    <a:bodyPr/>
+                    <a:lstStyle/>
+                    <a:p>
+                      <a:r>
+                        <a:rPr sz="1200"/>
+                        <a:t>0</a:t>
+                      </a:r>
+                    </a:p>
+                  </a:txBody>
+                  <a:tcPr/>
+                </a:tc>
+                <a:tc>
+                  <a:txBody>
+                    <a:bodyPr/>
+                    <a:lstStyle/>
+                    <a:p>
+                      <a:r>
+                        <a:rPr sz="1200"/>
+                        <a:t>0</a:t>
                       </a:r>
                     </a:p>
                   </a:txBody>
@@ -3610,7 +3614,7 @@
       </p:graphicFrame>
       <p:pic>
         <p:nvPicPr>
-          <p:cNvPr id="4" name="Picture 3" descr="ASUS_EGG_UHD240_DP2.1.png"/>
+          <p:cNvPr id="4" name="Picture 3" descr="ASUS_PG32UCDMR-2025.png"/>
           <p:cNvPicPr>
             <a:picLocks noChangeAspect="1"/>
           </p:cNvPicPr>
@@ -3666,7 +3670,7 @@
           <a:lstStyle/>
           <a:p>
             <a:r>
-              <a:t>ASUS_Stone_UHD240Tue Nov  5 17:24:13 2024</a:t>
+              <a:t>ASUS_XG27AQDPGMon Mar 24 10:41:15 2025</a:t>
             </a:r>
           </a:p>
         </p:txBody>
@@ -3799,20 +3803,20 @@
                     <a:p>
                       <a:r>
                         <a:rPr sz="1200"/>
-                        <a:t>19</a:t>
-                      </a:r>
-                    </a:p>
-                  </a:txBody>
-                  <a:tcPr/>
-                </a:tc>
-                <a:tc>
-                  <a:txBody>
-                    <a:bodyPr/>
-                    <a:lstStyle/>
-                    <a:p>
-                      <a:r>
-                        <a:rPr sz="1200"/>
-                        <a:t>29</a:t>
+                        <a:t>7</a:t>
+                      </a:r>
+                    </a:p>
+                  </a:txBody>
+                  <a:tcPr/>
+                </a:tc>
+                <a:tc>
+                  <a:txBody>
+                    <a:bodyPr/>
+                    <a:lstStyle/>
+                    <a:p>
+                      <a:r>
+                        <a:rPr sz="1200"/>
+                        <a:t>10</a:t>
                       </a:r>
                     </a:p>
                   </a:txBody>
@@ -3838,46 +3842,46 @@
                     <a:p>
                       <a:r>
                         <a:rPr sz="1200"/>
-                        <a:t>4</a:t>
-                      </a:r>
-                    </a:p>
-                  </a:txBody>
-                  <a:tcPr/>
-                </a:tc>
-                <a:tc>
-                  <a:txBody>
-                    <a:bodyPr/>
-                    <a:lstStyle/>
-                    <a:p>
-                      <a:r>
-                        <a:rPr sz="1200"/>
-                        <a:t>7</a:t>
-                      </a:r>
-                    </a:p>
-                  </a:txBody>
-                  <a:tcPr/>
-                </a:tc>
-                <a:tc>
-                  <a:txBody>
-                    <a:bodyPr/>
-                    <a:lstStyle/>
-                    <a:p>
-                      <a:r>
-                        <a:rPr sz="1200"/>
-                        <a:t>0</a:t>
-                      </a:r>
-                    </a:p>
-                  </a:txBody>
-                  <a:tcPr/>
-                </a:tc>
-                <a:tc>
-                  <a:txBody>
-                    <a:bodyPr/>
-                    <a:lstStyle/>
-                    <a:p>
-                      <a:r>
-                        <a:rPr sz="1200"/>
-                        <a:t>59</a:t>
+                        <a:t>1</a:t>
+                      </a:r>
+                    </a:p>
+                  </a:txBody>
+                  <a:tcPr/>
+                </a:tc>
+                <a:tc>
+                  <a:txBody>
+                    <a:bodyPr/>
+                    <a:lstStyle/>
+                    <a:p>
+                      <a:r>
+                        <a:rPr sz="1200"/>
+                        <a:t>5</a:t>
+                      </a:r>
+                    </a:p>
+                  </a:txBody>
+                  <a:tcPr/>
+                </a:tc>
+                <a:tc>
+                  <a:txBody>
+                    <a:bodyPr/>
+                    <a:lstStyle/>
+                    <a:p>
+                      <a:r>
+                        <a:rPr sz="1200"/>
+                        <a:t>2</a:t>
+                      </a:r>
+                    </a:p>
+                  </a:txBody>
+                  <a:tcPr/>
+                </a:tc>
+                <a:tc>
+                  <a:txBody>
+                    <a:bodyPr/>
+                    <a:lstStyle/>
+                    <a:p>
+                      <a:r>
+                        <a:rPr sz="1200"/>
+                        <a:t>25</a:t>
                       </a:r>
                     </a:p>
                   </a:txBody>
@@ -3890,7 +3894,1127 @@
       </p:graphicFrame>
       <p:pic>
         <p:nvPicPr>
-          <p:cNvPr id="4" name="Picture 3" descr="ASUS_Stone_UHD240.png"/>
+          <p:cNvPr id="4" name="Picture 3" descr="ASUS_XG27AQDPG.png"/>
+          <p:cNvPicPr>
+            <a:picLocks noChangeAspect="1"/>
+          </p:cNvPicPr>
+          <p:nvPr/>
+        </p:nvPicPr>
+        <p:blipFill>
+          <a:blip r:embed="rId2"/>
+          <a:stretch>
+            <a:fillRect/>
+          </a:stretch>
+        </p:blipFill>
+        <p:spPr>
+          <a:xfrm>
+            <a:off x="2743200" y="3657600"/>
+            <a:ext cx="4572000" cy="2857500"/>
+          </a:xfrm>
+          <a:prstGeom prst="rect">
+            <a:avLst/>
+          </a:prstGeom>
+        </p:spPr>
+      </p:pic>
+    </p:spTree>
+  </p:cSld>
+  <p:clrMapOvr>
+    <a:masterClrMapping/>
+  </p:clrMapOvr>
+</p:sld>
+</file>
+
+<file path=ppt/slides/slide4.xml><?xml version="1.0" encoding="utf-8"?>
+<p:sld xmlns:a="http://schemas.openxmlformats.org/drawingml/2006/main" xmlns:p="http://schemas.openxmlformats.org/presentationml/2006/main" xmlns:r="http://schemas.openxmlformats.org/officeDocument/2006/relationships">
+  <p:cSld>
+    <p:spTree>
+      <p:nvGrpSpPr>
+        <p:cNvPr id="1" name=""/>
+        <p:cNvGrpSpPr/>
+        <p:nvPr/>
+      </p:nvGrpSpPr>
+      <p:grpSpPr/>
+      <p:sp>
+        <p:nvSpPr>
+          <p:cNvPr id="2" name="Title 1"/>
+          <p:cNvSpPr>
+            <a:spLocks noGrp="1"/>
+          </p:cNvSpPr>
+          <p:nvPr>
+            <p:ph type="title"/>
+          </p:nvPr>
+        </p:nvSpPr>
+        <p:spPr/>
+        <p:txBody>
+          <a:bodyPr/>
+          <a:lstStyle/>
+          <a:p>
+            <a:r>
+              <a:t>MSI_MAG 272QP QD-OLED X50_2024Mon Mar 24 10:41:15 2025</a:t>
+            </a:r>
+          </a:p>
+        </p:txBody>
+      </p:sp>
+      <p:graphicFrame>
+        <p:nvGraphicFramePr>
+          <p:cNvPr id="3" name="Table 2"/>
+          <p:cNvGraphicFramePr>
+            <a:graphicFrameLocks noGrp="1"/>
+          </p:cNvGraphicFramePr>
+          <p:nvPr/>
+        </p:nvGraphicFramePr>
+        <p:xfrm>
+          <a:off x="914400" y="1828800"/>
+          <a:ext cx="5486400" cy="365760"/>
+        </p:xfrm>
+        <a:graphic>
+          <a:graphicData uri="http://schemas.openxmlformats.org/drawingml/2006/table">
+            <a:tbl>
+              <a:tblPr firstRow="1" bandRow="1">
+                <a:tableStyleId>{5C22544A-7EE6-4342-B048-85BDC9FD1C3A}</a:tableStyleId>
+              </a:tblPr>
+              <a:tblGrid>
+                <a:gridCol w="822960"/>
+                <a:gridCol w="822960"/>
+                <a:gridCol w="822960"/>
+                <a:gridCol w="822960"/>
+                <a:gridCol w="914400"/>
+                <a:gridCol w="731520"/>
+                <a:gridCol w="548640"/>
+              </a:tblGrid>
+              <a:tr h="182880">
+                <a:tc>
+                  <a:txBody>
+                    <a:bodyPr/>
+                    <a:lstStyle/>
+                    <a:p>
+                      <a:r>
+                        <a:rPr sz="1200"/>
+                        <a:t>OSD 操作介面</a:t>
+                      </a:r>
+                    </a:p>
+                  </a:txBody>
+                  <a:tcPr/>
+                </a:tc>
+                <a:tc>
+                  <a:txBody>
+                    <a:bodyPr/>
+                    <a:lstStyle/>
+                    <a:p>
+                      <a:r>
+                        <a:rPr sz="1200"/>
+                        <a:t>SYS 系統行為</a:t>
+                      </a:r>
+                    </a:p>
+                  </a:txBody>
+                  <a:tcPr/>
+                </a:tc>
+                <a:tc>
+                  <a:txBody>
+                    <a:bodyPr/>
+                    <a:lstStyle/>
+                    <a:p>
+                      <a:r>
+                        <a:rPr sz="1200"/>
+                        <a:t>Audio 爆音異音</a:t>
+                      </a:r>
+                    </a:p>
+                  </a:txBody>
+                  <a:tcPr/>
+                </a:tc>
+                <a:tc>
+                  <a:txBody>
+                    <a:bodyPr/>
+                    <a:lstStyle/>
+                    <a:p>
+                      <a:r>
+                        <a:rPr sz="1200"/>
+                        <a:t>PQ 畫質相關</a:t>
+                      </a:r>
+                    </a:p>
+                  </a:txBody>
+                  <a:tcPr/>
+                </a:tc>
+                <a:tc>
+                  <a:txBody>
+                    <a:bodyPr/>
+                    <a:lstStyle/>
+                    <a:p>
+                      <a:r>
+                        <a:rPr sz="1200"/>
+                        <a:t>Video 畫異、閃屏</a:t>
+                      </a:r>
+                    </a:p>
+                  </a:txBody>
+                  <a:tcPr/>
+                </a:tc>
+                <a:tc>
+                  <a:txBody>
+                    <a:bodyPr/>
+                    <a:lstStyle/>
+                    <a:p>
+                      <a:r>
+                        <a:rPr sz="1200"/>
+                        <a:t>待處理</a:t>
+                      </a:r>
+                    </a:p>
+                  </a:txBody>
+                  <a:tcPr/>
+                </a:tc>
+                <a:tc>
+                  <a:txBody>
+                    <a:bodyPr/>
+                    <a:lstStyle/>
+                    <a:p>
+                      <a:r>
+                        <a:rPr sz="1200"/>
+                        <a:t>Total</a:t>
+                      </a:r>
+                    </a:p>
+                  </a:txBody>
+                  <a:tcPr/>
+                </a:tc>
+              </a:tr>
+              <a:tr h="182880">
+                <a:tc>
+                  <a:txBody>
+                    <a:bodyPr/>
+                    <a:lstStyle/>
+                    <a:p>
+                      <a:r>
+                        <a:rPr sz="1200"/>
+                        <a:t>1</a:t>
+                      </a:r>
+                    </a:p>
+                  </a:txBody>
+                  <a:tcPr/>
+                </a:tc>
+                <a:tc>
+                  <a:txBody>
+                    <a:bodyPr/>
+                    <a:lstStyle/>
+                    <a:p>
+                      <a:r>
+                        <a:rPr sz="1200"/>
+                        <a:t>8</a:t>
+                      </a:r>
+                    </a:p>
+                  </a:txBody>
+                  <a:tcPr/>
+                </a:tc>
+                <a:tc>
+                  <a:txBody>
+                    <a:bodyPr/>
+                    <a:lstStyle/>
+                    <a:p>
+                      <a:r>
+                        <a:rPr sz="1200"/>
+                        <a:t>0</a:t>
+                      </a:r>
+                    </a:p>
+                  </a:txBody>
+                  <a:tcPr/>
+                </a:tc>
+                <a:tc>
+                  <a:txBody>
+                    <a:bodyPr/>
+                    <a:lstStyle/>
+                    <a:p>
+                      <a:r>
+                        <a:rPr sz="1200"/>
+                        <a:t>2</a:t>
+                      </a:r>
+                    </a:p>
+                  </a:txBody>
+                  <a:tcPr/>
+                </a:tc>
+                <a:tc>
+                  <a:txBody>
+                    <a:bodyPr/>
+                    <a:lstStyle/>
+                    <a:p>
+                      <a:r>
+                        <a:rPr sz="1200"/>
+                        <a:t>6</a:t>
+                      </a:r>
+                    </a:p>
+                  </a:txBody>
+                  <a:tcPr/>
+                </a:tc>
+                <a:tc>
+                  <a:txBody>
+                    <a:bodyPr/>
+                    <a:lstStyle/>
+                    <a:p>
+                      <a:r>
+                        <a:rPr sz="1200"/>
+                        <a:t>0</a:t>
+                      </a:r>
+                    </a:p>
+                  </a:txBody>
+                  <a:tcPr/>
+                </a:tc>
+                <a:tc>
+                  <a:txBody>
+                    <a:bodyPr/>
+                    <a:lstStyle/>
+                    <a:p>
+                      <a:r>
+                        <a:rPr sz="1200"/>
+                        <a:t>17</a:t>
+                      </a:r>
+                    </a:p>
+                  </a:txBody>
+                  <a:tcPr/>
+                </a:tc>
+              </a:tr>
+            </a:tbl>
+          </a:graphicData>
+        </a:graphic>
+      </p:graphicFrame>
+      <p:pic>
+        <p:nvPicPr>
+          <p:cNvPr id="4" name="Picture 3" descr="MSI_MAG 272QP QD-OLED X50_2024.png"/>
+          <p:cNvPicPr>
+            <a:picLocks noChangeAspect="1"/>
+          </p:cNvPicPr>
+          <p:nvPr/>
+        </p:nvPicPr>
+        <p:blipFill>
+          <a:blip r:embed="rId2"/>
+          <a:stretch>
+            <a:fillRect/>
+          </a:stretch>
+        </p:blipFill>
+        <p:spPr>
+          <a:xfrm>
+            <a:off x="2743200" y="3657600"/>
+            <a:ext cx="4572000" cy="2857500"/>
+          </a:xfrm>
+          <a:prstGeom prst="rect">
+            <a:avLst/>
+          </a:prstGeom>
+        </p:spPr>
+      </p:pic>
+    </p:spTree>
+  </p:cSld>
+  <p:clrMapOvr>
+    <a:masterClrMapping/>
+  </p:clrMapOvr>
+</p:sld>
+</file>
+
+<file path=ppt/slides/slide5.xml><?xml version="1.0" encoding="utf-8"?>
+<p:sld xmlns:a="http://schemas.openxmlformats.org/drawingml/2006/main" xmlns:p="http://schemas.openxmlformats.org/presentationml/2006/main" xmlns:r="http://schemas.openxmlformats.org/officeDocument/2006/relationships">
+  <p:cSld>
+    <p:spTree>
+      <p:nvGrpSpPr>
+        <p:cNvPr id="1" name=""/>
+        <p:cNvGrpSpPr/>
+        <p:nvPr/>
+      </p:nvGrpSpPr>
+      <p:grpSpPr/>
+      <p:sp>
+        <p:nvSpPr>
+          <p:cNvPr id="2" name="Title 1"/>
+          <p:cNvSpPr>
+            <a:spLocks noGrp="1"/>
+          </p:cNvSpPr>
+          <p:nvPr>
+            <p:ph type="title"/>
+          </p:nvPr>
+        </p:nvSpPr>
+        <p:spPr/>
+        <p:txBody>
+          <a:bodyPr/>
+          <a:lstStyle/>
+          <a:p>
+            <a:r>
+              <a:t>ASUS_VG27AQML5AMon Mar 24 10:41:15 2025</a:t>
+            </a:r>
+          </a:p>
+        </p:txBody>
+      </p:sp>
+      <p:graphicFrame>
+        <p:nvGraphicFramePr>
+          <p:cNvPr id="3" name="Table 2"/>
+          <p:cNvGraphicFramePr>
+            <a:graphicFrameLocks noGrp="1"/>
+          </p:cNvGraphicFramePr>
+          <p:nvPr/>
+        </p:nvGraphicFramePr>
+        <p:xfrm>
+          <a:off x="914400" y="1828800"/>
+          <a:ext cx="5486400" cy="365760"/>
+        </p:xfrm>
+        <a:graphic>
+          <a:graphicData uri="http://schemas.openxmlformats.org/drawingml/2006/table">
+            <a:tbl>
+              <a:tblPr firstRow="1" bandRow="1">
+                <a:tableStyleId>{5C22544A-7EE6-4342-B048-85BDC9FD1C3A}</a:tableStyleId>
+              </a:tblPr>
+              <a:tblGrid>
+                <a:gridCol w="822960"/>
+                <a:gridCol w="822960"/>
+                <a:gridCol w="822960"/>
+                <a:gridCol w="822960"/>
+                <a:gridCol w="914400"/>
+                <a:gridCol w="731520"/>
+                <a:gridCol w="548640"/>
+              </a:tblGrid>
+              <a:tr h="182880">
+                <a:tc>
+                  <a:txBody>
+                    <a:bodyPr/>
+                    <a:lstStyle/>
+                    <a:p>
+                      <a:r>
+                        <a:rPr sz="1200"/>
+                        <a:t>OSD 操作介面</a:t>
+                      </a:r>
+                    </a:p>
+                  </a:txBody>
+                  <a:tcPr/>
+                </a:tc>
+                <a:tc>
+                  <a:txBody>
+                    <a:bodyPr/>
+                    <a:lstStyle/>
+                    <a:p>
+                      <a:r>
+                        <a:rPr sz="1200"/>
+                        <a:t>SYS 系統行為</a:t>
+                      </a:r>
+                    </a:p>
+                  </a:txBody>
+                  <a:tcPr/>
+                </a:tc>
+                <a:tc>
+                  <a:txBody>
+                    <a:bodyPr/>
+                    <a:lstStyle/>
+                    <a:p>
+                      <a:r>
+                        <a:rPr sz="1200"/>
+                        <a:t>Audio 爆音異音</a:t>
+                      </a:r>
+                    </a:p>
+                  </a:txBody>
+                  <a:tcPr/>
+                </a:tc>
+                <a:tc>
+                  <a:txBody>
+                    <a:bodyPr/>
+                    <a:lstStyle/>
+                    <a:p>
+                      <a:r>
+                        <a:rPr sz="1200"/>
+                        <a:t>PQ 畫質相關</a:t>
+                      </a:r>
+                    </a:p>
+                  </a:txBody>
+                  <a:tcPr/>
+                </a:tc>
+                <a:tc>
+                  <a:txBody>
+                    <a:bodyPr/>
+                    <a:lstStyle/>
+                    <a:p>
+                      <a:r>
+                        <a:rPr sz="1200"/>
+                        <a:t>Video 畫異、閃屏</a:t>
+                      </a:r>
+                    </a:p>
+                  </a:txBody>
+                  <a:tcPr/>
+                </a:tc>
+                <a:tc>
+                  <a:txBody>
+                    <a:bodyPr/>
+                    <a:lstStyle/>
+                    <a:p>
+                      <a:r>
+                        <a:rPr sz="1200"/>
+                        <a:t>待處理</a:t>
+                      </a:r>
+                    </a:p>
+                  </a:txBody>
+                  <a:tcPr/>
+                </a:tc>
+                <a:tc>
+                  <a:txBody>
+                    <a:bodyPr/>
+                    <a:lstStyle/>
+                    <a:p>
+                      <a:r>
+                        <a:rPr sz="1200"/>
+                        <a:t>Total</a:t>
+                      </a:r>
+                    </a:p>
+                  </a:txBody>
+                  <a:tcPr/>
+                </a:tc>
+              </a:tr>
+              <a:tr h="182880">
+                <a:tc>
+                  <a:txBody>
+                    <a:bodyPr/>
+                    <a:lstStyle/>
+                    <a:p>
+                      <a:r>
+                        <a:rPr sz="1200"/>
+                        <a:t>0</a:t>
+                      </a:r>
+                    </a:p>
+                  </a:txBody>
+                  <a:tcPr/>
+                </a:tc>
+                <a:tc>
+                  <a:txBody>
+                    <a:bodyPr/>
+                    <a:lstStyle/>
+                    <a:p>
+                      <a:r>
+                        <a:rPr sz="1200"/>
+                        <a:t>0</a:t>
+                      </a:r>
+                    </a:p>
+                  </a:txBody>
+                  <a:tcPr/>
+                </a:tc>
+                <a:tc>
+                  <a:txBody>
+                    <a:bodyPr/>
+                    <a:lstStyle/>
+                    <a:p>
+                      <a:r>
+                        <a:rPr sz="1200"/>
+                        <a:t>0</a:t>
+                      </a:r>
+                    </a:p>
+                  </a:txBody>
+                  <a:tcPr/>
+                </a:tc>
+                <a:tc>
+                  <a:txBody>
+                    <a:bodyPr/>
+                    <a:lstStyle/>
+                    <a:p>
+                      <a:r>
+                        <a:rPr sz="1200"/>
+                        <a:t>0</a:t>
+                      </a:r>
+                    </a:p>
+                  </a:txBody>
+                  <a:tcPr/>
+                </a:tc>
+                <a:tc>
+                  <a:txBody>
+                    <a:bodyPr/>
+                    <a:lstStyle/>
+                    <a:p>
+                      <a:r>
+                        <a:rPr sz="1200"/>
+                        <a:t>0</a:t>
+                      </a:r>
+                    </a:p>
+                  </a:txBody>
+                  <a:tcPr/>
+                </a:tc>
+                <a:tc>
+                  <a:txBody>
+                    <a:bodyPr/>
+                    <a:lstStyle/>
+                    <a:p>
+                      <a:r>
+                        <a:rPr sz="1200"/>
+                        <a:t>0</a:t>
+                      </a:r>
+                    </a:p>
+                  </a:txBody>
+                  <a:tcPr/>
+                </a:tc>
+                <a:tc>
+                  <a:txBody>
+                    <a:bodyPr/>
+                    <a:lstStyle/>
+                    <a:p>
+                      <a:r>
+                        <a:rPr sz="1200"/>
+                        <a:t>0</a:t>
+                      </a:r>
+                    </a:p>
+                  </a:txBody>
+                  <a:tcPr/>
+                </a:tc>
+              </a:tr>
+            </a:tbl>
+          </a:graphicData>
+        </a:graphic>
+      </p:graphicFrame>
+      <p:pic>
+        <p:nvPicPr>
+          <p:cNvPr id="4" name="Picture 3" descr="ASUS_VG27AQML5A.png"/>
+          <p:cNvPicPr>
+            <a:picLocks noChangeAspect="1"/>
+          </p:cNvPicPr>
+          <p:nvPr/>
+        </p:nvPicPr>
+        <p:blipFill>
+          <a:blip r:embed="rId2"/>
+          <a:stretch>
+            <a:fillRect/>
+          </a:stretch>
+        </p:blipFill>
+        <p:spPr>
+          <a:xfrm>
+            <a:off x="2743200" y="3657600"/>
+            <a:ext cx="4572000" cy="2857500"/>
+          </a:xfrm>
+          <a:prstGeom prst="rect">
+            <a:avLst/>
+          </a:prstGeom>
+        </p:spPr>
+      </p:pic>
+    </p:spTree>
+  </p:cSld>
+  <p:clrMapOvr>
+    <a:masterClrMapping/>
+  </p:clrMapOvr>
+</p:sld>
+</file>
+
+<file path=ppt/slides/slide6.xml><?xml version="1.0" encoding="utf-8"?>
+<p:sld xmlns:a="http://schemas.openxmlformats.org/drawingml/2006/main" xmlns:p="http://schemas.openxmlformats.org/presentationml/2006/main" xmlns:r="http://schemas.openxmlformats.org/officeDocument/2006/relationships">
+  <p:cSld>
+    <p:spTree>
+      <p:nvGrpSpPr>
+        <p:cNvPr id="1" name=""/>
+        <p:cNvGrpSpPr/>
+        <p:nvPr/>
+      </p:nvGrpSpPr>
+      <p:grpSpPr/>
+      <p:sp>
+        <p:nvSpPr>
+          <p:cNvPr id="2" name="Title 1"/>
+          <p:cNvSpPr>
+            <a:spLocks noGrp="1"/>
+          </p:cNvSpPr>
+          <p:nvPr>
+            <p:ph type="title"/>
+          </p:nvPr>
+        </p:nvSpPr>
+        <p:spPr/>
+        <p:txBody>
+          <a:bodyPr/>
+          <a:lstStyle/>
+          <a:p>
+            <a:r>
+              <a:t>ASUS-VG27AQML5A-W-2025Mon Mar 24 10:41:15 2025</a:t>
+            </a:r>
+          </a:p>
+        </p:txBody>
+      </p:sp>
+      <p:graphicFrame>
+        <p:nvGraphicFramePr>
+          <p:cNvPr id="3" name="Table 2"/>
+          <p:cNvGraphicFramePr>
+            <a:graphicFrameLocks noGrp="1"/>
+          </p:cNvGraphicFramePr>
+          <p:nvPr/>
+        </p:nvGraphicFramePr>
+        <p:xfrm>
+          <a:off x="914400" y="1828800"/>
+          <a:ext cx="5486400" cy="365760"/>
+        </p:xfrm>
+        <a:graphic>
+          <a:graphicData uri="http://schemas.openxmlformats.org/drawingml/2006/table">
+            <a:tbl>
+              <a:tblPr firstRow="1" bandRow="1">
+                <a:tableStyleId>{5C22544A-7EE6-4342-B048-85BDC9FD1C3A}</a:tableStyleId>
+              </a:tblPr>
+              <a:tblGrid>
+                <a:gridCol w="822960"/>
+                <a:gridCol w="822960"/>
+                <a:gridCol w="822960"/>
+                <a:gridCol w="822960"/>
+                <a:gridCol w="914400"/>
+                <a:gridCol w="731520"/>
+                <a:gridCol w="548640"/>
+              </a:tblGrid>
+              <a:tr h="182880">
+                <a:tc>
+                  <a:txBody>
+                    <a:bodyPr/>
+                    <a:lstStyle/>
+                    <a:p>
+                      <a:r>
+                        <a:rPr sz="1200"/>
+                        <a:t>OSD 操作介面</a:t>
+                      </a:r>
+                    </a:p>
+                  </a:txBody>
+                  <a:tcPr/>
+                </a:tc>
+                <a:tc>
+                  <a:txBody>
+                    <a:bodyPr/>
+                    <a:lstStyle/>
+                    <a:p>
+                      <a:r>
+                        <a:rPr sz="1200"/>
+                        <a:t>SYS 系統行為</a:t>
+                      </a:r>
+                    </a:p>
+                  </a:txBody>
+                  <a:tcPr/>
+                </a:tc>
+                <a:tc>
+                  <a:txBody>
+                    <a:bodyPr/>
+                    <a:lstStyle/>
+                    <a:p>
+                      <a:r>
+                        <a:rPr sz="1200"/>
+                        <a:t>Audio 爆音異音</a:t>
+                      </a:r>
+                    </a:p>
+                  </a:txBody>
+                  <a:tcPr/>
+                </a:tc>
+                <a:tc>
+                  <a:txBody>
+                    <a:bodyPr/>
+                    <a:lstStyle/>
+                    <a:p>
+                      <a:r>
+                        <a:rPr sz="1200"/>
+                        <a:t>PQ 畫質相關</a:t>
+                      </a:r>
+                    </a:p>
+                  </a:txBody>
+                  <a:tcPr/>
+                </a:tc>
+                <a:tc>
+                  <a:txBody>
+                    <a:bodyPr/>
+                    <a:lstStyle/>
+                    <a:p>
+                      <a:r>
+                        <a:rPr sz="1200"/>
+                        <a:t>Video 畫異、閃屏</a:t>
+                      </a:r>
+                    </a:p>
+                  </a:txBody>
+                  <a:tcPr/>
+                </a:tc>
+                <a:tc>
+                  <a:txBody>
+                    <a:bodyPr/>
+                    <a:lstStyle/>
+                    <a:p>
+                      <a:r>
+                        <a:rPr sz="1200"/>
+                        <a:t>待處理</a:t>
+                      </a:r>
+                    </a:p>
+                  </a:txBody>
+                  <a:tcPr/>
+                </a:tc>
+                <a:tc>
+                  <a:txBody>
+                    <a:bodyPr/>
+                    <a:lstStyle/>
+                    <a:p>
+                      <a:r>
+                        <a:rPr sz="1200"/>
+                        <a:t>Total</a:t>
+                      </a:r>
+                    </a:p>
+                  </a:txBody>
+                  <a:tcPr/>
+                </a:tc>
+              </a:tr>
+              <a:tr h="182880">
+                <a:tc>
+                  <a:txBody>
+                    <a:bodyPr/>
+                    <a:lstStyle/>
+                    <a:p>
+                      <a:r>
+                        <a:rPr sz="1200"/>
+                        <a:t>0</a:t>
+                      </a:r>
+                    </a:p>
+                  </a:txBody>
+                  <a:tcPr/>
+                </a:tc>
+                <a:tc>
+                  <a:txBody>
+                    <a:bodyPr/>
+                    <a:lstStyle/>
+                    <a:p>
+                      <a:r>
+                        <a:rPr sz="1200"/>
+                        <a:t>0</a:t>
+                      </a:r>
+                    </a:p>
+                  </a:txBody>
+                  <a:tcPr/>
+                </a:tc>
+                <a:tc>
+                  <a:txBody>
+                    <a:bodyPr/>
+                    <a:lstStyle/>
+                    <a:p>
+                      <a:r>
+                        <a:rPr sz="1200"/>
+                        <a:t>0</a:t>
+                      </a:r>
+                    </a:p>
+                  </a:txBody>
+                  <a:tcPr/>
+                </a:tc>
+                <a:tc>
+                  <a:txBody>
+                    <a:bodyPr/>
+                    <a:lstStyle/>
+                    <a:p>
+                      <a:r>
+                        <a:rPr sz="1200"/>
+                        <a:t>0</a:t>
+                      </a:r>
+                    </a:p>
+                  </a:txBody>
+                  <a:tcPr/>
+                </a:tc>
+                <a:tc>
+                  <a:txBody>
+                    <a:bodyPr/>
+                    <a:lstStyle/>
+                    <a:p>
+                      <a:r>
+                        <a:rPr sz="1200"/>
+                        <a:t>0</a:t>
+                      </a:r>
+                    </a:p>
+                  </a:txBody>
+                  <a:tcPr/>
+                </a:tc>
+                <a:tc>
+                  <a:txBody>
+                    <a:bodyPr/>
+                    <a:lstStyle/>
+                    <a:p>
+                      <a:r>
+                        <a:rPr sz="1200"/>
+                        <a:t>0</a:t>
+                      </a:r>
+                    </a:p>
+                  </a:txBody>
+                  <a:tcPr/>
+                </a:tc>
+                <a:tc>
+                  <a:txBody>
+                    <a:bodyPr/>
+                    <a:lstStyle/>
+                    <a:p>
+                      <a:r>
+                        <a:rPr sz="1200"/>
+                        <a:t>0</a:t>
+                      </a:r>
+                    </a:p>
+                  </a:txBody>
+                  <a:tcPr/>
+                </a:tc>
+              </a:tr>
+            </a:tbl>
+          </a:graphicData>
+        </a:graphic>
+      </p:graphicFrame>
+      <p:pic>
+        <p:nvPicPr>
+          <p:cNvPr id="4" name="Picture 3" descr="ASUS_PG32UCDMR-2025.png"/>
+          <p:cNvPicPr>
+            <a:picLocks noChangeAspect="1"/>
+          </p:cNvPicPr>
+          <p:nvPr/>
+        </p:nvPicPr>
+        <p:blipFill>
+          <a:blip r:embed="rId2"/>
+          <a:stretch>
+            <a:fillRect/>
+          </a:stretch>
+        </p:blipFill>
+        <p:spPr>
+          <a:xfrm>
+            <a:off x="2743200" y="3657600"/>
+            <a:ext cx="4572000" cy="2857500"/>
+          </a:xfrm>
+          <a:prstGeom prst="rect">
+            <a:avLst/>
+          </a:prstGeom>
+        </p:spPr>
+      </p:pic>
+    </p:spTree>
+  </p:cSld>
+  <p:clrMapOvr>
+    <a:masterClrMapping/>
+  </p:clrMapOvr>
+</p:sld>
+</file>
+
+<file path=ppt/slides/slide7.xml><?xml version="1.0" encoding="utf-8"?>
+<p:sld xmlns:a="http://schemas.openxmlformats.org/drawingml/2006/main" xmlns:p="http://schemas.openxmlformats.org/presentationml/2006/main" xmlns:r="http://schemas.openxmlformats.org/officeDocument/2006/relationships">
+  <p:cSld>
+    <p:spTree>
+      <p:nvGrpSpPr>
+        <p:cNvPr id="1" name=""/>
+        <p:cNvGrpSpPr/>
+        <p:nvPr/>
+      </p:nvGrpSpPr>
+      <p:grpSpPr/>
+      <p:sp>
+        <p:nvSpPr>
+          <p:cNvPr id="2" name="Title 1"/>
+          <p:cNvSpPr>
+            <a:spLocks noGrp="1"/>
+          </p:cNvSpPr>
+          <p:nvPr>
+            <p:ph type="title"/>
+          </p:nvPr>
+        </p:nvSpPr>
+        <p:spPr/>
+        <p:txBody>
+          <a:bodyPr/>
+          <a:lstStyle/>
+          <a:p>
+            <a:r>
+              <a:t>Novatek_SoCMAG272QP_X50Mon Mar 24 10:41:15 2025</a:t>
+            </a:r>
+          </a:p>
+        </p:txBody>
+      </p:sp>
+      <p:graphicFrame>
+        <p:nvGraphicFramePr>
+          <p:cNvPr id="3" name="Table 2"/>
+          <p:cNvGraphicFramePr>
+            <a:graphicFrameLocks noGrp="1"/>
+          </p:cNvGraphicFramePr>
+          <p:nvPr/>
+        </p:nvGraphicFramePr>
+        <p:xfrm>
+          <a:off x="914400" y="1828800"/>
+          <a:ext cx="5486400" cy="365760"/>
+        </p:xfrm>
+        <a:graphic>
+          <a:graphicData uri="http://schemas.openxmlformats.org/drawingml/2006/table">
+            <a:tbl>
+              <a:tblPr firstRow="1" bandRow="1">
+                <a:tableStyleId>{5C22544A-7EE6-4342-B048-85BDC9FD1C3A}</a:tableStyleId>
+              </a:tblPr>
+              <a:tblGrid>
+                <a:gridCol w="822960"/>
+                <a:gridCol w="822960"/>
+                <a:gridCol w="822960"/>
+                <a:gridCol w="822960"/>
+                <a:gridCol w="914400"/>
+                <a:gridCol w="731520"/>
+                <a:gridCol w="548640"/>
+              </a:tblGrid>
+              <a:tr h="182880">
+                <a:tc>
+                  <a:txBody>
+                    <a:bodyPr/>
+                    <a:lstStyle/>
+                    <a:p>
+                      <a:r>
+                        <a:rPr sz="1200"/>
+                        <a:t>OSD 操作介面</a:t>
+                      </a:r>
+                    </a:p>
+                  </a:txBody>
+                  <a:tcPr/>
+                </a:tc>
+                <a:tc>
+                  <a:txBody>
+                    <a:bodyPr/>
+                    <a:lstStyle/>
+                    <a:p>
+                      <a:r>
+                        <a:rPr sz="1200"/>
+                        <a:t>SYS 系統行為</a:t>
+                      </a:r>
+                    </a:p>
+                  </a:txBody>
+                  <a:tcPr/>
+                </a:tc>
+                <a:tc>
+                  <a:txBody>
+                    <a:bodyPr/>
+                    <a:lstStyle/>
+                    <a:p>
+                      <a:r>
+                        <a:rPr sz="1200"/>
+                        <a:t>Audio 爆音異音</a:t>
+                      </a:r>
+                    </a:p>
+                  </a:txBody>
+                  <a:tcPr/>
+                </a:tc>
+                <a:tc>
+                  <a:txBody>
+                    <a:bodyPr/>
+                    <a:lstStyle/>
+                    <a:p>
+                      <a:r>
+                        <a:rPr sz="1200"/>
+                        <a:t>PQ 畫質相關</a:t>
+                      </a:r>
+                    </a:p>
+                  </a:txBody>
+                  <a:tcPr/>
+                </a:tc>
+                <a:tc>
+                  <a:txBody>
+                    <a:bodyPr/>
+                    <a:lstStyle/>
+                    <a:p>
+                      <a:r>
+                        <a:rPr sz="1200"/>
+                        <a:t>Video 畫異、閃屏</a:t>
+                      </a:r>
+                    </a:p>
+                  </a:txBody>
+                  <a:tcPr/>
+                </a:tc>
+                <a:tc>
+                  <a:txBody>
+                    <a:bodyPr/>
+                    <a:lstStyle/>
+                    <a:p>
+                      <a:r>
+                        <a:rPr sz="1200"/>
+                        <a:t>待處理</a:t>
+                      </a:r>
+                    </a:p>
+                  </a:txBody>
+                  <a:tcPr/>
+                </a:tc>
+                <a:tc>
+                  <a:txBody>
+                    <a:bodyPr/>
+                    <a:lstStyle/>
+                    <a:p>
+                      <a:r>
+                        <a:rPr sz="1200"/>
+                        <a:t>Total</a:t>
+                      </a:r>
+                    </a:p>
+                  </a:txBody>
+                  <a:tcPr/>
+                </a:tc>
+              </a:tr>
+              <a:tr h="182880">
+                <a:tc>
+                  <a:txBody>
+                    <a:bodyPr/>
+                    <a:lstStyle/>
+                    <a:p>
+                      <a:r>
+                        <a:rPr sz="1200"/>
+                        <a:t>2</a:t>
+                      </a:r>
+                    </a:p>
+                  </a:txBody>
+                  <a:tcPr/>
+                </a:tc>
+                <a:tc>
+                  <a:txBody>
+                    <a:bodyPr/>
+                    <a:lstStyle/>
+                    <a:p>
+                      <a:r>
+                        <a:rPr sz="1200"/>
+                        <a:t>3</a:t>
+                      </a:r>
+                    </a:p>
+                  </a:txBody>
+                  <a:tcPr/>
+                </a:tc>
+                <a:tc>
+                  <a:txBody>
+                    <a:bodyPr/>
+                    <a:lstStyle/>
+                    <a:p>
+                      <a:r>
+                        <a:rPr sz="1200"/>
+                        <a:t>0</a:t>
+                      </a:r>
+                    </a:p>
+                  </a:txBody>
+                  <a:tcPr/>
+                </a:tc>
+                <a:tc>
+                  <a:txBody>
+                    <a:bodyPr/>
+                    <a:lstStyle/>
+                    <a:p>
+                      <a:r>
+                        <a:rPr sz="1200"/>
+                        <a:t>0</a:t>
+                      </a:r>
+                    </a:p>
+                  </a:txBody>
+                  <a:tcPr/>
+                </a:tc>
+                <a:tc>
+                  <a:txBody>
+                    <a:bodyPr/>
+                    <a:lstStyle/>
+                    <a:p>
+                      <a:r>
+                        <a:rPr sz="1200"/>
+                        <a:t>5</a:t>
+                      </a:r>
+                    </a:p>
+                  </a:txBody>
+                  <a:tcPr/>
+                </a:tc>
+                <a:tc>
+                  <a:txBody>
+                    <a:bodyPr/>
+                    <a:lstStyle/>
+                    <a:p>
+                      <a:r>
+                        <a:rPr sz="1200"/>
+                        <a:t>3</a:t>
+                      </a:r>
+                    </a:p>
+                  </a:txBody>
+                  <a:tcPr/>
+                </a:tc>
+                <a:tc>
+                  <a:txBody>
+                    <a:bodyPr/>
+                    <a:lstStyle/>
+                    <a:p>
+                      <a:r>
+                        <a:rPr sz="1200"/>
+                        <a:t>13</a:t>
+                      </a:r>
+                    </a:p>
+                  </a:txBody>
+                  <a:tcPr/>
+                </a:tc>
+              </a:tr>
+            </a:tbl>
+          </a:graphicData>
+        </a:graphic>
+      </p:graphicFrame>
+      <p:pic>
+        <p:nvPicPr>
+          <p:cNvPr id="4" name="Picture 3" descr="Novatek_SoCMAG272QP_X50.png"/>
           <p:cNvPicPr>
             <a:picLocks noChangeAspect="1"/>
           </p:cNvPicPr>

</xml_diff>

<commit_message>
[refactor] - To remove MP models
</commit_message>
<xml_diff>
--- a/Jira/PPT/jira_npi.pptx
+++ b/Jira/PPT/jira_npi.pptx
@@ -7,11 +7,6 @@
   <p:sldIdLst>
     <p:sldId id="256" r:id="rId7"/>
     <p:sldId id="257" r:id="rId8"/>
-    <p:sldId id="258" r:id="rId9"/>
-    <p:sldId id="259" r:id="rId10"/>
-    <p:sldId id="260" r:id="rId11"/>
-    <p:sldId id="261" r:id="rId12"/>
-    <p:sldId id="262" r:id="rId13"/>
   </p:sldIdLst>
   <p:sldSz cx="9144000" cy="6858000" type="screen4x3"/>
   <p:notesSz cx="6858000" cy="9144000"/>
@@ -3110,7 +3105,7 @@
           <a:lstStyle/>
           <a:p>
             <a:r>
-              <a:t>GIGABYTE AORUS FO27Q5PMon Mar 24 10:41:15 2025</a:t>
+              <a:t>GIGABYTE AORUS FO27Q5PMon May 26 09:37:34 2025</a:t>
             </a:r>
           </a:p>
         </p:txBody>
@@ -3243,7 +3238,7 @@
                     <a:p>
                       <a:r>
                         <a:rPr sz="1200"/>
-                        <a:t>40</a:t>
+                        <a:t>11</a:t>
                       </a:r>
                     </a:p>
                   </a:txBody>
@@ -3256,7 +3251,46 @@
                     <a:p>
                       <a:r>
                         <a:rPr sz="1200"/>
-                        <a:t>32</a:t>
+                        <a:t>17</a:t>
+                      </a:r>
+                    </a:p>
+                  </a:txBody>
+                  <a:tcPr/>
+                </a:tc>
+                <a:tc>
+                  <a:txBody>
+                    <a:bodyPr/>
+                    <a:lstStyle/>
+                    <a:p>
+                      <a:r>
+                        <a:rPr sz="1200"/>
+                        <a:t>2</a:t>
+                      </a:r>
+                    </a:p>
+                  </a:txBody>
+                  <a:tcPr/>
+                </a:tc>
+                <a:tc>
+                  <a:txBody>
+                    <a:bodyPr/>
+                    <a:lstStyle/>
+                    <a:p>
+                      <a:r>
+                        <a:rPr sz="1200"/>
+                        <a:t>0</a:t>
+                      </a:r>
+                    </a:p>
+                  </a:txBody>
+                  <a:tcPr/>
+                </a:tc>
+                <a:tc>
+                  <a:txBody>
+                    <a:bodyPr/>
+                    <a:lstStyle/>
+                    <a:p>
+                      <a:r>
+                        <a:rPr sz="1200"/>
+                        <a:t>7</a:t>
                       </a:r>
                     </a:p>
                   </a:txBody>
@@ -3282,46 +3316,7 @@
                     <a:p>
                       <a:r>
                         <a:rPr sz="1200"/>
-                        <a:t>1</a:t>
-                      </a:r>
-                    </a:p>
-                  </a:txBody>
-                  <a:tcPr/>
-                </a:tc>
-                <a:tc>
-                  <a:txBody>
-                    <a:bodyPr/>
-                    <a:lstStyle/>
-                    <a:p>
-                      <a:r>
-                        <a:rPr sz="1200"/>
-                        <a:t>3</a:t>
-                      </a:r>
-                    </a:p>
-                  </a:txBody>
-                  <a:tcPr/>
-                </a:tc>
-                <a:tc>
-                  <a:txBody>
-                    <a:bodyPr/>
-                    <a:lstStyle/>
-                    <a:p>
-                      <a:r>
-                        <a:rPr sz="1200"/>
-                        <a:t>12</a:t>
-                      </a:r>
-                    </a:p>
-                  </a:txBody>
-                  <a:tcPr/>
-                </a:tc>
-                <a:tc>
-                  <a:txBody>
-                    <a:bodyPr/>
-                    <a:lstStyle/>
-                    <a:p>
-                      <a:r>
-                        <a:rPr sz="1200"/>
-                        <a:t>93</a:t>
+                        <a:t>42</a:t>
                       </a:r>
                     </a:p>
                   </a:txBody>
@@ -3390,7 +3385,7 @@
           <a:lstStyle/>
           <a:p>
             <a:r>
-              <a:t>ASUS_PG32UCDMR-2025Mon Mar 24 10:41:15 2025</a:t>
+              <a:t>Realtek_SoCFO27Q5PMon May 26 09:37:35 2025</a:t>
             </a:r>
           </a:p>
         </p:txBody>
@@ -3523,7 +3518,20 @@
                     <a:p>
                       <a:r>
                         <a:rPr sz="1200"/>
-                        <a:t>0</a:t>
+                        <a:t>9</a:t>
+                      </a:r>
+                    </a:p>
+                  </a:txBody>
+                  <a:tcPr/>
+                </a:tc>
+                <a:tc>
+                  <a:txBody>
+                    <a:bodyPr/>
+                    <a:lstStyle/>
+                    <a:p>
+                      <a:r>
+                        <a:rPr sz="1200"/>
+                        <a:t>8</a:t>
                       </a:r>
                     </a:p>
                   </a:txBody>
@@ -3562,286 +3570,6 @@
                     <a:p>
                       <a:r>
                         <a:rPr sz="1200"/>
-                        <a:t>0</a:t>
-                      </a:r>
-                    </a:p>
-                  </a:txBody>
-                  <a:tcPr/>
-                </a:tc>
-                <a:tc>
-                  <a:txBody>
-                    <a:bodyPr/>
-                    <a:lstStyle/>
-                    <a:p>
-                      <a:r>
-                        <a:rPr sz="1200"/>
-                        <a:t>0</a:t>
-                      </a:r>
-                    </a:p>
-                  </a:txBody>
-                  <a:tcPr/>
-                </a:tc>
-                <a:tc>
-                  <a:txBody>
-                    <a:bodyPr/>
-                    <a:lstStyle/>
-                    <a:p>
-                      <a:r>
-                        <a:rPr sz="1200"/>
-                        <a:t>0</a:t>
-                      </a:r>
-                    </a:p>
-                  </a:txBody>
-                  <a:tcPr/>
-                </a:tc>
-                <a:tc>
-                  <a:txBody>
-                    <a:bodyPr/>
-                    <a:lstStyle/>
-                    <a:p>
-                      <a:r>
-                        <a:rPr sz="1200"/>
-                        <a:t>0</a:t>
-                      </a:r>
-                    </a:p>
-                  </a:txBody>
-                  <a:tcPr/>
-                </a:tc>
-              </a:tr>
-            </a:tbl>
-          </a:graphicData>
-        </a:graphic>
-      </p:graphicFrame>
-      <p:pic>
-        <p:nvPicPr>
-          <p:cNvPr id="4" name="Picture 3" descr="ASUS_PG32UCDMR-2025.png"/>
-          <p:cNvPicPr>
-            <a:picLocks noChangeAspect="1"/>
-          </p:cNvPicPr>
-          <p:nvPr/>
-        </p:nvPicPr>
-        <p:blipFill>
-          <a:blip r:embed="rId2"/>
-          <a:stretch>
-            <a:fillRect/>
-          </a:stretch>
-        </p:blipFill>
-        <p:spPr>
-          <a:xfrm>
-            <a:off x="2743200" y="3657600"/>
-            <a:ext cx="4572000" cy="2857500"/>
-          </a:xfrm>
-          <a:prstGeom prst="rect">
-            <a:avLst/>
-          </a:prstGeom>
-        </p:spPr>
-      </p:pic>
-    </p:spTree>
-  </p:cSld>
-  <p:clrMapOvr>
-    <a:masterClrMapping/>
-  </p:clrMapOvr>
-</p:sld>
-</file>
-
-<file path=ppt/slides/slide3.xml><?xml version="1.0" encoding="utf-8"?>
-<p:sld xmlns:a="http://schemas.openxmlformats.org/drawingml/2006/main" xmlns:p="http://schemas.openxmlformats.org/presentationml/2006/main" xmlns:r="http://schemas.openxmlformats.org/officeDocument/2006/relationships">
-  <p:cSld>
-    <p:spTree>
-      <p:nvGrpSpPr>
-        <p:cNvPr id="1" name=""/>
-        <p:cNvGrpSpPr/>
-        <p:nvPr/>
-      </p:nvGrpSpPr>
-      <p:grpSpPr/>
-      <p:sp>
-        <p:nvSpPr>
-          <p:cNvPr id="2" name="Title 1"/>
-          <p:cNvSpPr>
-            <a:spLocks noGrp="1"/>
-          </p:cNvSpPr>
-          <p:nvPr>
-            <p:ph type="title"/>
-          </p:nvPr>
-        </p:nvSpPr>
-        <p:spPr/>
-        <p:txBody>
-          <a:bodyPr/>
-          <a:lstStyle/>
-          <a:p>
-            <a:r>
-              <a:t>ASUS_XG27AQDPGMon Mar 24 10:41:15 2025</a:t>
-            </a:r>
-          </a:p>
-        </p:txBody>
-      </p:sp>
-      <p:graphicFrame>
-        <p:nvGraphicFramePr>
-          <p:cNvPr id="3" name="Table 2"/>
-          <p:cNvGraphicFramePr>
-            <a:graphicFrameLocks noGrp="1"/>
-          </p:cNvGraphicFramePr>
-          <p:nvPr/>
-        </p:nvGraphicFramePr>
-        <p:xfrm>
-          <a:off x="914400" y="1828800"/>
-          <a:ext cx="5486400" cy="365760"/>
-        </p:xfrm>
-        <a:graphic>
-          <a:graphicData uri="http://schemas.openxmlformats.org/drawingml/2006/table">
-            <a:tbl>
-              <a:tblPr firstRow="1" bandRow="1">
-                <a:tableStyleId>{5C22544A-7EE6-4342-B048-85BDC9FD1C3A}</a:tableStyleId>
-              </a:tblPr>
-              <a:tblGrid>
-                <a:gridCol w="822960"/>
-                <a:gridCol w="822960"/>
-                <a:gridCol w="822960"/>
-                <a:gridCol w="822960"/>
-                <a:gridCol w="914400"/>
-                <a:gridCol w="731520"/>
-                <a:gridCol w="548640"/>
-              </a:tblGrid>
-              <a:tr h="182880">
-                <a:tc>
-                  <a:txBody>
-                    <a:bodyPr/>
-                    <a:lstStyle/>
-                    <a:p>
-                      <a:r>
-                        <a:rPr sz="1200"/>
-                        <a:t>OSD 操作介面</a:t>
-                      </a:r>
-                    </a:p>
-                  </a:txBody>
-                  <a:tcPr/>
-                </a:tc>
-                <a:tc>
-                  <a:txBody>
-                    <a:bodyPr/>
-                    <a:lstStyle/>
-                    <a:p>
-                      <a:r>
-                        <a:rPr sz="1200"/>
-                        <a:t>SYS 系統行為</a:t>
-                      </a:r>
-                    </a:p>
-                  </a:txBody>
-                  <a:tcPr/>
-                </a:tc>
-                <a:tc>
-                  <a:txBody>
-                    <a:bodyPr/>
-                    <a:lstStyle/>
-                    <a:p>
-                      <a:r>
-                        <a:rPr sz="1200"/>
-                        <a:t>Audio 爆音異音</a:t>
-                      </a:r>
-                    </a:p>
-                  </a:txBody>
-                  <a:tcPr/>
-                </a:tc>
-                <a:tc>
-                  <a:txBody>
-                    <a:bodyPr/>
-                    <a:lstStyle/>
-                    <a:p>
-                      <a:r>
-                        <a:rPr sz="1200"/>
-                        <a:t>PQ 畫質相關</a:t>
-                      </a:r>
-                    </a:p>
-                  </a:txBody>
-                  <a:tcPr/>
-                </a:tc>
-                <a:tc>
-                  <a:txBody>
-                    <a:bodyPr/>
-                    <a:lstStyle/>
-                    <a:p>
-                      <a:r>
-                        <a:rPr sz="1200"/>
-                        <a:t>Video 畫異、閃屏</a:t>
-                      </a:r>
-                    </a:p>
-                  </a:txBody>
-                  <a:tcPr/>
-                </a:tc>
-                <a:tc>
-                  <a:txBody>
-                    <a:bodyPr/>
-                    <a:lstStyle/>
-                    <a:p>
-                      <a:r>
-                        <a:rPr sz="1200"/>
-                        <a:t>待處理</a:t>
-                      </a:r>
-                    </a:p>
-                  </a:txBody>
-                  <a:tcPr/>
-                </a:tc>
-                <a:tc>
-                  <a:txBody>
-                    <a:bodyPr/>
-                    <a:lstStyle/>
-                    <a:p>
-                      <a:r>
-                        <a:rPr sz="1200"/>
-                        <a:t>Total</a:t>
-                      </a:r>
-                    </a:p>
-                  </a:txBody>
-                  <a:tcPr/>
-                </a:tc>
-              </a:tr>
-              <a:tr h="182880">
-                <a:tc>
-                  <a:txBody>
-                    <a:bodyPr/>
-                    <a:lstStyle/>
-                    <a:p>
-                      <a:r>
-                        <a:rPr sz="1200"/>
-                        <a:t>7</a:t>
-                      </a:r>
-                    </a:p>
-                  </a:txBody>
-                  <a:tcPr/>
-                </a:tc>
-                <a:tc>
-                  <a:txBody>
-                    <a:bodyPr/>
-                    <a:lstStyle/>
-                    <a:p>
-                      <a:r>
-                        <a:rPr sz="1200"/>
-                        <a:t>10</a:t>
-                      </a:r>
-                    </a:p>
-                  </a:txBody>
-                  <a:tcPr/>
-                </a:tc>
-                <a:tc>
-                  <a:txBody>
-                    <a:bodyPr/>
-                    <a:lstStyle/>
-                    <a:p>
-                      <a:r>
-                        <a:rPr sz="1200"/>
-                        <a:t>0</a:t>
-                      </a:r>
-                    </a:p>
-                  </a:txBody>
-                  <a:tcPr/>
-                </a:tc>
-                <a:tc>
-                  <a:txBody>
-                    <a:bodyPr/>
-                    <a:lstStyle/>
-                    <a:p>
-                      <a:r>
-                        <a:rPr sz="1200"/>
                         <a:t>1</a:t>
                       </a:r>
                     </a:p>
@@ -3855,7 +3583,7 @@
                     <a:p>
                       <a:r>
                         <a:rPr sz="1200"/>
-                        <a:t>5</a:t>
+                        <a:t>4</a:t>
                       </a:r>
                     </a:p>
                   </a:txBody>
@@ -3868,20 +3596,7 @@
                     <a:p>
                       <a:r>
                         <a:rPr sz="1200"/>
-                        <a:t>2</a:t>
-                      </a:r>
-                    </a:p>
-                  </a:txBody>
-                  <a:tcPr/>
-                </a:tc>
-                <a:tc>
-                  <a:txBody>
-                    <a:bodyPr/>
-                    <a:lstStyle/>
-                    <a:p>
-                      <a:r>
-                        <a:rPr sz="1200"/>
-                        <a:t>25</a:t>
+                        <a:t>22</a:t>
                       </a:r>
                     </a:p>
                   </a:txBody>
@@ -3894,1127 +3609,7 @@
       </p:graphicFrame>
       <p:pic>
         <p:nvPicPr>
-          <p:cNvPr id="4" name="Picture 3" descr="ASUS_XG27AQDPG.png"/>
-          <p:cNvPicPr>
-            <a:picLocks noChangeAspect="1"/>
-          </p:cNvPicPr>
-          <p:nvPr/>
-        </p:nvPicPr>
-        <p:blipFill>
-          <a:blip r:embed="rId2"/>
-          <a:stretch>
-            <a:fillRect/>
-          </a:stretch>
-        </p:blipFill>
-        <p:spPr>
-          <a:xfrm>
-            <a:off x="2743200" y="3657600"/>
-            <a:ext cx="4572000" cy="2857500"/>
-          </a:xfrm>
-          <a:prstGeom prst="rect">
-            <a:avLst/>
-          </a:prstGeom>
-        </p:spPr>
-      </p:pic>
-    </p:spTree>
-  </p:cSld>
-  <p:clrMapOvr>
-    <a:masterClrMapping/>
-  </p:clrMapOvr>
-</p:sld>
-</file>
-
-<file path=ppt/slides/slide4.xml><?xml version="1.0" encoding="utf-8"?>
-<p:sld xmlns:a="http://schemas.openxmlformats.org/drawingml/2006/main" xmlns:p="http://schemas.openxmlformats.org/presentationml/2006/main" xmlns:r="http://schemas.openxmlformats.org/officeDocument/2006/relationships">
-  <p:cSld>
-    <p:spTree>
-      <p:nvGrpSpPr>
-        <p:cNvPr id="1" name=""/>
-        <p:cNvGrpSpPr/>
-        <p:nvPr/>
-      </p:nvGrpSpPr>
-      <p:grpSpPr/>
-      <p:sp>
-        <p:nvSpPr>
-          <p:cNvPr id="2" name="Title 1"/>
-          <p:cNvSpPr>
-            <a:spLocks noGrp="1"/>
-          </p:cNvSpPr>
-          <p:nvPr>
-            <p:ph type="title"/>
-          </p:nvPr>
-        </p:nvSpPr>
-        <p:spPr/>
-        <p:txBody>
-          <a:bodyPr/>
-          <a:lstStyle/>
-          <a:p>
-            <a:r>
-              <a:t>MSI_MAG 272QP QD-OLED X50_2024Mon Mar 24 10:41:15 2025</a:t>
-            </a:r>
-          </a:p>
-        </p:txBody>
-      </p:sp>
-      <p:graphicFrame>
-        <p:nvGraphicFramePr>
-          <p:cNvPr id="3" name="Table 2"/>
-          <p:cNvGraphicFramePr>
-            <a:graphicFrameLocks noGrp="1"/>
-          </p:cNvGraphicFramePr>
-          <p:nvPr/>
-        </p:nvGraphicFramePr>
-        <p:xfrm>
-          <a:off x="914400" y="1828800"/>
-          <a:ext cx="5486400" cy="365760"/>
-        </p:xfrm>
-        <a:graphic>
-          <a:graphicData uri="http://schemas.openxmlformats.org/drawingml/2006/table">
-            <a:tbl>
-              <a:tblPr firstRow="1" bandRow="1">
-                <a:tableStyleId>{5C22544A-7EE6-4342-B048-85BDC9FD1C3A}</a:tableStyleId>
-              </a:tblPr>
-              <a:tblGrid>
-                <a:gridCol w="822960"/>
-                <a:gridCol w="822960"/>
-                <a:gridCol w="822960"/>
-                <a:gridCol w="822960"/>
-                <a:gridCol w="914400"/>
-                <a:gridCol w="731520"/>
-                <a:gridCol w="548640"/>
-              </a:tblGrid>
-              <a:tr h="182880">
-                <a:tc>
-                  <a:txBody>
-                    <a:bodyPr/>
-                    <a:lstStyle/>
-                    <a:p>
-                      <a:r>
-                        <a:rPr sz="1200"/>
-                        <a:t>OSD 操作介面</a:t>
-                      </a:r>
-                    </a:p>
-                  </a:txBody>
-                  <a:tcPr/>
-                </a:tc>
-                <a:tc>
-                  <a:txBody>
-                    <a:bodyPr/>
-                    <a:lstStyle/>
-                    <a:p>
-                      <a:r>
-                        <a:rPr sz="1200"/>
-                        <a:t>SYS 系統行為</a:t>
-                      </a:r>
-                    </a:p>
-                  </a:txBody>
-                  <a:tcPr/>
-                </a:tc>
-                <a:tc>
-                  <a:txBody>
-                    <a:bodyPr/>
-                    <a:lstStyle/>
-                    <a:p>
-                      <a:r>
-                        <a:rPr sz="1200"/>
-                        <a:t>Audio 爆音異音</a:t>
-                      </a:r>
-                    </a:p>
-                  </a:txBody>
-                  <a:tcPr/>
-                </a:tc>
-                <a:tc>
-                  <a:txBody>
-                    <a:bodyPr/>
-                    <a:lstStyle/>
-                    <a:p>
-                      <a:r>
-                        <a:rPr sz="1200"/>
-                        <a:t>PQ 畫質相關</a:t>
-                      </a:r>
-                    </a:p>
-                  </a:txBody>
-                  <a:tcPr/>
-                </a:tc>
-                <a:tc>
-                  <a:txBody>
-                    <a:bodyPr/>
-                    <a:lstStyle/>
-                    <a:p>
-                      <a:r>
-                        <a:rPr sz="1200"/>
-                        <a:t>Video 畫異、閃屏</a:t>
-                      </a:r>
-                    </a:p>
-                  </a:txBody>
-                  <a:tcPr/>
-                </a:tc>
-                <a:tc>
-                  <a:txBody>
-                    <a:bodyPr/>
-                    <a:lstStyle/>
-                    <a:p>
-                      <a:r>
-                        <a:rPr sz="1200"/>
-                        <a:t>待處理</a:t>
-                      </a:r>
-                    </a:p>
-                  </a:txBody>
-                  <a:tcPr/>
-                </a:tc>
-                <a:tc>
-                  <a:txBody>
-                    <a:bodyPr/>
-                    <a:lstStyle/>
-                    <a:p>
-                      <a:r>
-                        <a:rPr sz="1200"/>
-                        <a:t>Total</a:t>
-                      </a:r>
-                    </a:p>
-                  </a:txBody>
-                  <a:tcPr/>
-                </a:tc>
-              </a:tr>
-              <a:tr h="182880">
-                <a:tc>
-                  <a:txBody>
-                    <a:bodyPr/>
-                    <a:lstStyle/>
-                    <a:p>
-                      <a:r>
-                        <a:rPr sz="1200"/>
-                        <a:t>1</a:t>
-                      </a:r>
-                    </a:p>
-                  </a:txBody>
-                  <a:tcPr/>
-                </a:tc>
-                <a:tc>
-                  <a:txBody>
-                    <a:bodyPr/>
-                    <a:lstStyle/>
-                    <a:p>
-                      <a:r>
-                        <a:rPr sz="1200"/>
-                        <a:t>8</a:t>
-                      </a:r>
-                    </a:p>
-                  </a:txBody>
-                  <a:tcPr/>
-                </a:tc>
-                <a:tc>
-                  <a:txBody>
-                    <a:bodyPr/>
-                    <a:lstStyle/>
-                    <a:p>
-                      <a:r>
-                        <a:rPr sz="1200"/>
-                        <a:t>0</a:t>
-                      </a:r>
-                    </a:p>
-                  </a:txBody>
-                  <a:tcPr/>
-                </a:tc>
-                <a:tc>
-                  <a:txBody>
-                    <a:bodyPr/>
-                    <a:lstStyle/>
-                    <a:p>
-                      <a:r>
-                        <a:rPr sz="1200"/>
-                        <a:t>2</a:t>
-                      </a:r>
-                    </a:p>
-                  </a:txBody>
-                  <a:tcPr/>
-                </a:tc>
-                <a:tc>
-                  <a:txBody>
-                    <a:bodyPr/>
-                    <a:lstStyle/>
-                    <a:p>
-                      <a:r>
-                        <a:rPr sz="1200"/>
-                        <a:t>6</a:t>
-                      </a:r>
-                    </a:p>
-                  </a:txBody>
-                  <a:tcPr/>
-                </a:tc>
-                <a:tc>
-                  <a:txBody>
-                    <a:bodyPr/>
-                    <a:lstStyle/>
-                    <a:p>
-                      <a:r>
-                        <a:rPr sz="1200"/>
-                        <a:t>0</a:t>
-                      </a:r>
-                    </a:p>
-                  </a:txBody>
-                  <a:tcPr/>
-                </a:tc>
-                <a:tc>
-                  <a:txBody>
-                    <a:bodyPr/>
-                    <a:lstStyle/>
-                    <a:p>
-                      <a:r>
-                        <a:rPr sz="1200"/>
-                        <a:t>17</a:t>
-                      </a:r>
-                    </a:p>
-                  </a:txBody>
-                  <a:tcPr/>
-                </a:tc>
-              </a:tr>
-            </a:tbl>
-          </a:graphicData>
-        </a:graphic>
-      </p:graphicFrame>
-      <p:pic>
-        <p:nvPicPr>
-          <p:cNvPr id="4" name="Picture 3" descr="MSI_MAG 272QP QD-OLED X50_2024.png"/>
-          <p:cNvPicPr>
-            <a:picLocks noChangeAspect="1"/>
-          </p:cNvPicPr>
-          <p:nvPr/>
-        </p:nvPicPr>
-        <p:blipFill>
-          <a:blip r:embed="rId2"/>
-          <a:stretch>
-            <a:fillRect/>
-          </a:stretch>
-        </p:blipFill>
-        <p:spPr>
-          <a:xfrm>
-            <a:off x="2743200" y="3657600"/>
-            <a:ext cx="4572000" cy="2857500"/>
-          </a:xfrm>
-          <a:prstGeom prst="rect">
-            <a:avLst/>
-          </a:prstGeom>
-        </p:spPr>
-      </p:pic>
-    </p:spTree>
-  </p:cSld>
-  <p:clrMapOvr>
-    <a:masterClrMapping/>
-  </p:clrMapOvr>
-</p:sld>
-</file>
-
-<file path=ppt/slides/slide5.xml><?xml version="1.0" encoding="utf-8"?>
-<p:sld xmlns:a="http://schemas.openxmlformats.org/drawingml/2006/main" xmlns:p="http://schemas.openxmlformats.org/presentationml/2006/main" xmlns:r="http://schemas.openxmlformats.org/officeDocument/2006/relationships">
-  <p:cSld>
-    <p:spTree>
-      <p:nvGrpSpPr>
-        <p:cNvPr id="1" name=""/>
-        <p:cNvGrpSpPr/>
-        <p:nvPr/>
-      </p:nvGrpSpPr>
-      <p:grpSpPr/>
-      <p:sp>
-        <p:nvSpPr>
-          <p:cNvPr id="2" name="Title 1"/>
-          <p:cNvSpPr>
-            <a:spLocks noGrp="1"/>
-          </p:cNvSpPr>
-          <p:nvPr>
-            <p:ph type="title"/>
-          </p:nvPr>
-        </p:nvSpPr>
-        <p:spPr/>
-        <p:txBody>
-          <a:bodyPr/>
-          <a:lstStyle/>
-          <a:p>
-            <a:r>
-              <a:t>ASUS_VG27AQML5AMon Mar 24 10:41:15 2025</a:t>
-            </a:r>
-          </a:p>
-        </p:txBody>
-      </p:sp>
-      <p:graphicFrame>
-        <p:nvGraphicFramePr>
-          <p:cNvPr id="3" name="Table 2"/>
-          <p:cNvGraphicFramePr>
-            <a:graphicFrameLocks noGrp="1"/>
-          </p:cNvGraphicFramePr>
-          <p:nvPr/>
-        </p:nvGraphicFramePr>
-        <p:xfrm>
-          <a:off x="914400" y="1828800"/>
-          <a:ext cx="5486400" cy="365760"/>
-        </p:xfrm>
-        <a:graphic>
-          <a:graphicData uri="http://schemas.openxmlformats.org/drawingml/2006/table">
-            <a:tbl>
-              <a:tblPr firstRow="1" bandRow="1">
-                <a:tableStyleId>{5C22544A-7EE6-4342-B048-85BDC9FD1C3A}</a:tableStyleId>
-              </a:tblPr>
-              <a:tblGrid>
-                <a:gridCol w="822960"/>
-                <a:gridCol w="822960"/>
-                <a:gridCol w="822960"/>
-                <a:gridCol w="822960"/>
-                <a:gridCol w="914400"/>
-                <a:gridCol w="731520"/>
-                <a:gridCol w="548640"/>
-              </a:tblGrid>
-              <a:tr h="182880">
-                <a:tc>
-                  <a:txBody>
-                    <a:bodyPr/>
-                    <a:lstStyle/>
-                    <a:p>
-                      <a:r>
-                        <a:rPr sz="1200"/>
-                        <a:t>OSD 操作介面</a:t>
-                      </a:r>
-                    </a:p>
-                  </a:txBody>
-                  <a:tcPr/>
-                </a:tc>
-                <a:tc>
-                  <a:txBody>
-                    <a:bodyPr/>
-                    <a:lstStyle/>
-                    <a:p>
-                      <a:r>
-                        <a:rPr sz="1200"/>
-                        <a:t>SYS 系統行為</a:t>
-                      </a:r>
-                    </a:p>
-                  </a:txBody>
-                  <a:tcPr/>
-                </a:tc>
-                <a:tc>
-                  <a:txBody>
-                    <a:bodyPr/>
-                    <a:lstStyle/>
-                    <a:p>
-                      <a:r>
-                        <a:rPr sz="1200"/>
-                        <a:t>Audio 爆音異音</a:t>
-                      </a:r>
-                    </a:p>
-                  </a:txBody>
-                  <a:tcPr/>
-                </a:tc>
-                <a:tc>
-                  <a:txBody>
-                    <a:bodyPr/>
-                    <a:lstStyle/>
-                    <a:p>
-                      <a:r>
-                        <a:rPr sz="1200"/>
-                        <a:t>PQ 畫質相關</a:t>
-                      </a:r>
-                    </a:p>
-                  </a:txBody>
-                  <a:tcPr/>
-                </a:tc>
-                <a:tc>
-                  <a:txBody>
-                    <a:bodyPr/>
-                    <a:lstStyle/>
-                    <a:p>
-                      <a:r>
-                        <a:rPr sz="1200"/>
-                        <a:t>Video 畫異、閃屏</a:t>
-                      </a:r>
-                    </a:p>
-                  </a:txBody>
-                  <a:tcPr/>
-                </a:tc>
-                <a:tc>
-                  <a:txBody>
-                    <a:bodyPr/>
-                    <a:lstStyle/>
-                    <a:p>
-                      <a:r>
-                        <a:rPr sz="1200"/>
-                        <a:t>待處理</a:t>
-                      </a:r>
-                    </a:p>
-                  </a:txBody>
-                  <a:tcPr/>
-                </a:tc>
-                <a:tc>
-                  <a:txBody>
-                    <a:bodyPr/>
-                    <a:lstStyle/>
-                    <a:p>
-                      <a:r>
-                        <a:rPr sz="1200"/>
-                        <a:t>Total</a:t>
-                      </a:r>
-                    </a:p>
-                  </a:txBody>
-                  <a:tcPr/>
-                </a:tc>
-              </a:tr>
-              <a:tr h="182880">
-                <a:tc>
-                  <a:txBody>
-                    <a:bodyPr/>
-                    <a:lstStyle/>
-                    <a:p>
-                      <a:r>
-                        <a:rPr sz="1200"/>
-                        <a:t>0</a:t>
-                      </a:r>
-                    </a:p>
-                  </a:txBody>
-                  <a:tcPr/>
-                </a:tc>
-                <a:tc>
-                  <a:txBody>
-                    <a:bodyPr/>
-                    <a:lstStyle/>
-                    <a:p>
-                      <a:r>
-                        <a:rPr sz="1200"/>
-                        <a:t>0</a:t>
-                      </a:r>
-                    </a:p>
-                  </a:txBody>
-                  <a:tcPr/>
-                </a:tc>
-                <a:tc>
-                  <a:txBody>
-                    <a:bodyPr/>
-                    <a:lstStyle/>
-                    <a:p>
-                      <a:r>
-                        <a:rPr sz="1200"/>
-                        <a:t>0</a:t>
-                      </a:r>
-                    </a:p>
-                  </a:txBody>
-                  <a:tcPr/>
-                </a:tc>
-                <a:tc>
-                  <a:txBody>
-                    <a:bodyPr/>
-                    <a:lstStyle/>
-                    <a:p>
-                      <a:r>
-                        <a:rPr sz="1200"/>
-                        <a:t>0</a:t>
-                      </a:r>
-                    </a:p>
-                  </a:txBody>
-                  <a:tcPr/>
-                </a:tc>
-                <a:tc>
-                  <a:txBody>
-                    <a:bodyPr/>
-                    <a:lstStyle/>
-                    <a:p>
-                      <a:r>
-                        <a:rPr sz="1200"/>
-                        <a:t>0</a:t>
-                      </a:r>
-                    </a:p>
-                  </a:txBody>
-                  <a:tcPr/>
-                </a:tc>
-                <a:tc>
-                  <a:txBody>
-                    <a:bodyPr/>
-                    <a:lstStyle/>
-                    <a:p>
-                      <a:r>
-                        <a:rPr sz="1200"/>
-                        <a:t>0</a:t>
-                      </a:r>
-                    </a:p>
-                  </a:txBody>
-                  <a:tcPr/>
-                </a:tc>
-                <a:tc>
-                  <a:txBody>
-                    <a:bodyPr/>
-                    <a:lstStyle/>
-                    <a:p>
-                      <a:r>
-                        <a:rPr sz="1200"/>
-                        <a:t>0</a:t>
-                      </a:r>
-                    </a:p>
-                  </a:txBody>
-                  <a:tcPr/>
-                </a:tc>
-              </a:tr>
-            </a:tbl>
-          </a:graphicData>
-        </a:graphic>
-      </p:graphicFrame>
-      <p:pic>
-        <p:nvPicPr>
-          <p:cNvPr id="4" name="Picture 3" descr="ASUS_VG27AQML5A.png"/>
-          <p:cNvPicPr>
-            <a:picLocks noChangeAspect="1"/>
-          </p:cNvPicPr>
-          <p:nvPr/>
-        </p:nvPicPr>
-        <p:blipFill>
-          <a:blip r:embed="rId2"/>
-          <a:stretch>
-            <a:fillRect/>
-          </a:stretch>
-        </p:blipFill>
-        <p:spPr>
-          <a:xfrm>
-            <a:off x="2743200" y="3657600"/>
-            <a:ext cx="4572000" cy="2857500"/>
-          </a:xfrm>
-          <a:prstGeom prst="rect">
-            <a:avLst/>
-          </a:prstGeom>
-        </p:spPr>
-      </p:pic>
-    </p:spTree>
-  </p:cSld>
-  <p:clrMapOvr>
-    <a:masterClrMapping/>
-  </p:clrMapOvr>
-</p:sld>
-</file>
-
-<file path=ppt/slides/slide6.xml><?xml version="1.0" encoding="utf-8"?>
-<p:sld xmlns:a="http://schemas.openxmlformats.org/drawingml/2006/main" xmlns:p="http://schemas.openxmlformats.org/presentationml/2006/main" xmlns:r="http://schemas.openxmlformats.org/officeDocument/2006/relationships">
-  <p:cSld>
-    <p:spTree>
-      <p:nvGrpSpPr>
-        <p:cNvPr id="1" name=""/>
-        <p:cNvGrpSpPr/>
-        <p:nvPr/>
-      </p:nvGrpSpPr>
-      <p:grpSpPr/>
-      <p:sp>
-        <p:nvSpPr>
-          <p:cNvPr id="2" name="Title 1"/>
-          <p:cNvSpPr>
-            <a:spLocks noGrp="1"/>
-          </p:cNvSpPr>
-          <p:nvPr>
-            <p:ph type="title"/>
-          </p:nvPr>
-        </p:nvSpPr>
-        <p:spPr/>
-        <p:txBody>
-          <a:bodyPr/>
-          <a:lstStyle/>
-          <a:p>
-            <a:r>
-              <a:t>ASUS-VG27AQML5A-W-2025Mon Mar 24 10:41:15 2025</a:t>
-            </a:r>
-          </a:p>
-        </p:txBody>
-      </p:sp>
-      <p:graphicFrame>
-        <p:nvGraphicFramePr>
-          <p:cNvPr id="3" name="Table 2"/>
-          <p:cNvGraphicFramePr>
-            <a:graphicFrameLocks noGrp="1"/>
-          </p:cNvGraphicFramePr>
-          <p:nvPr/>
-        </p:nvGraphicFramePr>
-        <p:xfrm>
-          <a:off x="914400" y="1828800"/>
-          <a:ext cx="5486400" cy="365760"/>
-        </p:xfrm>
-        <a:graphic>
-          <a:graphicData uri="http://schemas.openxmlformats.org/drawingml/2006/table">
-            <a:tbl>
-              <a:tblPr firstRow="1" bandRow="1">
-                <a:tableStyleId>{5C22544A-7EE6-4342-B048-85BDC9FD1C3A}</a:tableStyleId>
-              </a:tblPr>
-              <a:tblGrid>
-                <a:gridCol w="822960"/>
-                <a:gridCol w="822960"/>
-                <a:gridCol w="822960"/>
-                <a:gridCol w="822960"/>
-                <a:gridCol w="914400"/>
-                <a:gridCol w="731520"/>
-                <a:gridCol w="548640"/>
-              </a:tblGrid>
-              <a:tr h="182880">
-                <a:tc>
-                  <a:txBody>
-                    <a:bodyPr/>
-                    <a:lstStyle/>
-                    <a:p>
-                      <a:r>
-                        <a:rPr sz="1200"/>
-                        <a:t>OSD 操作介面</a:t>
-                      </a:r>
-                    </a:p>
-                  </a:txBody>
-                  <a:tcPr/>
-                </a:tc>
-                <a:tc>
-                  <a:txBody>
-                    <a:bodyPr/>
-                    <a:lstStyle/>
-                    <a:p>
-                      <a:r>
-                        <a:rPr sz="1200"/>
-                        <a:t>SYS 系統行為</a:t>
-                      </a:r>
-                    </a:p>
-                  </a:txBody>
-                  <a:tcPr/>
-                </a:tc>
-                <a:tc>
-                  <a:txBody>
-                    <a:bodyPr/>
-                    <a:lstStyle/>
-                    <a:p>
-                      <a:r>
-                        <a:rPr sz="1200"/>
-                        <a:t>Audio 爆音異音</a:t>
-                      </a:r>
-                    </a:p>
-                  </a:txBody>
-                  <a:tcPr/>
-                </a:tc>
-                <a:tc>
-                  <a:txBody>
-                    <a:bodyPr/>
-                    <a:lstStyle/>
-                    <a:p>
-                      <a:r>
-                        <a:rPr sz="1200"/>
-                        <a:t>PQ 畫質相關</a:t>
-                      </a:r>
-                    </a:p>
-                  </a:txBody>
-                  <a:tcPr/>
-                </a:tc>
-                <a:tc>
-                  <a:txBody>
-                    <a:bodyPr/>
-                    <a:lstStyle/>
-                    <a:p>
-                      <a:r>
-                        <a:rPr sz="1200"/>
-                        <a:t>Video 畫異、閃屏</a:t>
-                      </a:r>
-                    </a:p>
-                  </a:txBody>
-                  <a:tcPr/>
-                </a:tc>
-                <a:tc>
-                  <a:txBody>
-                    <a:bodyPr/>
-                    <a:lstStyle/>
-                    <a:p>
-                      <a:r>
-                        <a:rPr sz="1200"/>
-                        <a:t>待處理</a:t>
-                      </a:r>
-                    </a:p>
-                  </a:txBody>
-                  <a:tcPr/>
-                </a:tc>
-                <a:tc>
-                  <a:txBody>
-                    <a:bodyPr/>
-                    <a:lstStyle/>
-                    <a:p>
-                      <a:r>
-                        <a:rPr sz="1200"/>
-                        <a:t>Total</a:t>
-                      </a:r>
-                    </a:p>
-                  </a:txBody>
-                  <a:tcPr/>
-                </a:tc>
-              </a:tr>
-              <a:tr h="182880">
-                <a:tc>
-                  <a:txBody>
-                    <a:bodyPr/>
-                    <a:lstStyle/>
-                    <a:p>
-                      <a:r>
-                        <a:rPr sz="1200"/>
-                        <a:t>0</a:t>
-                      </a:r>
-                    </a:p>
-                  </a:txBody>
-                  <a:tcPr/>
-                </a:tc>
-                <a:tc>
-                  <a:txBody>
-                    <a:bodyPr/>
-                    <a:lstStyle/>
-                    <a:p>
-                      <a:r>
-                        <a:rPr sz="1200"/>
-                        <a:t>0</a:t>
-                      </a:r>
-                    </a:p>
-                  </a:txBody>
-                  <a:tcPr/>
-                </a:tc>
-                <a:tc>
-                  <a:txBody>
-                    <a:bodyPr/>
-                    <a:lstStyle/>
-                    <a:p>
-                      <a:r>
-                        <a:rPr sz="1200"/>
-                        <a:t>0</a:t>
-                      </a:r>
-                    </a:p>
-                  </a:txBody>
-                  <a:tcPr/>
-                </a:tc>
-                <a:tc>
-                  <a:txBody>
-                    <a:bodyPr/>
-                    <a:lstStyle/>
-                    <a:p>
-                      <a:r>
-                        <a:rPr sz="1200"/>
-                        <a:t>0</a:t>
-                      </a:r>
-                    </a:p>
-                  </a:txBody>
-                  <a:tcPr/>
-                </a:tc>
-                <a:tc>
-                  <a:txBody>
-                    <a:bodyPr/>
-                    <a:lstStyle/>
-                    <a:p>
-                      <a:r>
-                        <a:rPr sz="1200"/>
-                        <a:t>0</a:t>
-                      </a:r>
-                    </a:p>
-                  </a:txBody>
-                  <a:tcPr/>
-                </a:tc>
-                <a:tc>
-                  <a:txBody>
-                    <a:bodyPr/>
-                    <a:lstStyle/>
-                    <a:p>
-                      <a:r>
-                        <a:rPr sz="1200"/>
-                        <a:t>0</a:t>
-                      </a:r>
-                    </a:p>
-                  </a:txBody>
-                  <a:tcPr/>
-                </a:tc>
-                <a:tc>
-                  <a:txBody>
-                    <a:bodyPr/>
-                    <a:lstStyle/>
-                    <a:p>
-                      <a:r>
-                        <a:rPr sz="1200"/>
-                        <a:t>0</a:t>
-                      </a:r>
-                    </a:p>
-                  </a:txBody>
-                  <a:tcPr/>
-                </a:tc>
-              </a:tr>
-            </a:tbl>
-          </a:graphicData>
-        </a:graphic>
-      </p:graphicFrame>
-      <p:pic>
-        <p:nvPicPr>
-          <p:cNvPr id="4" name="Picture 3" descr="ASUS_PG32UCDMR-2025.png"/>
-          <p:cNvPicPr>
-            <a:picLocks noChangeAspect="1"/>
-          </p:cNvPicPr>
-          <p:nvPr/>
-        </p:nvPicPr>
-        <p:blipFill>
-          <a:blip r:embed="rId2"/>
-          <a:stretch>
-            <a:fillRect/>
-          </a:stretch>
-        </p:blipFill>
-        <p:spPr>
-          <a:xfrm>
-            <a:off x="2743200" y="3657600"/>
-            <a:ext cx="4572000" cy="2857500"/>
-          </a:xfrm>
-          <a:prstGeom prst="rect">
-            <a:avLst/>
-          </a:prstGeom>
-        </p:spPr>
-      </p:pic>
-    </p:spTree>
-  </p:cSld>
-  <p:clrMapOvr>
-    <a:masterClrMapping/>
-  </p:clrMapOvr>
-</p:sld>
-</file>
-
-<file path=ppt/slides/slide7.xml><?xml version="1.0" encoding="utf-8"?>
-<p:sld xmlns:a="http://schemas.openxmlformats.org/drawingml/2006/main" xmlns:p="http://schemas.openxmlformats.org/presentationml/2006/main" xmlns:r="http://schemas.openxmlformats.org/officeDocument/2006/relationships">
-  <p:cSld>
-    <p:spTree>
-      <p:nvGrpSpPr>
-        <p:cNvPr id="1" name=""/>
-        <p:cNvGrpSpPr/>
-        <p:nvPr/>
-      </p:nvGrpSpPr>
-      <p:grpSpPr/>
-      <p:sp>
-        <p:nvSpPr>
-          <p:cNvPr id="2" name="Title 1"/>
-          <p:cNvSpPr>
-            <a:spLocks noGrp="1"/>
-          </p:cNvSpPr>
-          <p:nvPr>
-            <p:ph type="title"/>
-          </p:nvPr>
-        </p:nvSpPr>
-        <p:spPr/>
-        <p:txBody>
-          <a:bodyPr/>
-          <a:lstStyle/>
-          <a:p>
-            <a:r>
-              <a:t>Novatek_SoCMAG272QP_X50Mon Mar 24 10:41:15 2025</a:t>
-            </a:r>
-          </a:p>
-        </p:txBody>
-      </p:sp>
-      <p:graphicFrame>
-        <p:nvGraphicFramePr>
-          <p:cNvPr id="3" name="Table 2"/>
-          <p:cNvGraphicFramePr>
-            <a:graphicFrameLocks noGrp="1"/>
-          </p:cNvGraphicFramePr>
-          <p:nvPr/>
-        </p:nvGraphicFramePr>
-        <p:xfrm>
-          <a:off x="914400" y="1828800"/>
-          <a:ext cx="5486400" cy="365760"/>
-        </p:xfrm>
-        <a:graphic>
-          <a:graphicData uri="http://schemas.openxmlformats.org/drawingml/2006/table">
-            <a:tbl>
-              <a:tblPr firstRow="1" bandRow="1">
-                <a:tableStyleId>{5C22544A-7EE6-4342-B048-85BDC9FD1C3A}</a:tableStyleId>
-              </a:tblPr>
-              <a:tblGrid>
-                <a:gridCol w="822960"/>
-                <a:gridCol w="822960"/>
-                <a:gridCol w="822960"/>
-                <a:gridCol w="822960"/>
-                <a:gridCol w="914400"/>
-                <a:gridCol w="731520"/>
-                <a:gridCol w="548640"/>
-              </a:tblGrid>
-              <a:tr h="182880">
-                <a:tc>
-                  <a:txBody>
-                    <a:bodyPr/>
-                    <a:lstStyle/>
-                    <a:p>
-                      <a:r>
-                        <a:rPr sz="1200"/>
-                        <a:t>OSD 操作介面</a:t>
-                      </a:r>
-                    </a:p>
-                  </a:txBody>
-                  <a:tcPr/>
-                </a:tc>
-                <a:tc>
-                  <a:txBody>
-                    <a:bodyPr/>
-                    <a:lstStyle/>
-                    <a:p>
-                      <a:r>
-                        <a:rPr sz="1200"/>
-                        <a:t>SYS 系統行為</a:t>
-                      </a:r>
-                    </a:p>
-                  </a:txBody>
-                  <a:tcPr/>
-                </a:tc>
-                <a:tc>
-                  <a:txBody>
-                    <a:bodyPr/>
-                    <a:lstStyle/>
-                    <a:p>
-                      <a:r>
-                        <a:rPr sz="1200"/>
-                        <a:t>Audio 爆音異音</a:t>
-                      </a:r>
-                    </a:p>
-                  </a:txBody>
-                  <a:tcPr/>
-                </a:tc>
-                <a:tc>
-                  <a:txBody>
-                    <a:bodyPr/>
-                    <a:lstStyle/>
-                    <a:p>
-                      <a:r>
-                        <a:rPr sz="1200"/>
-                        <a:t>PQ 畫質相關</a:t>
-                      </a:r>
-                    </a:p>
-                  </a:txBody>
-                  <a:tcPr/>
-                </a:tc>
-                <a:tc>
-                  <a:txBody>
-                    <a:bodyPr/>
-                    <a:lstStyle/>
-                    <a:p>
-                      <a:r>
-                        <a:rPr sz="1200"/>
-                        <a:t>Video 畫異、閃屏</a:t>
-                      </a:r>
-                    </a:p>
-                  </a:txBody>
-                  <a:tcPr/>
-                </a:tc>
-                <a:tc>
-                  <a:txBody>
-                    <a:bodyPr/>
-                    <a:lstStyle/>
-                    <a:p>
-                      <a:r>
-                        <a:rPr sz="1200"/>
-                        <a:t>待處理</a:t>
-                      </a:r>
-                    </a:p>
-                  </a:txBody>
-                  <a:tcPr/>
-                </a:tc>
-                <a:tc>
-                  <a:txBody>
-                    <a:bodyPr/>
-                    <a:lstStyle/>
-                    <a:p>
-                      <a:r>
-                        <a:rPr sz="1200"/>
-                        <a:t>Total</a:t>
-                      </a:r>
-                    </a:p>
-                  </a:txBody>
-                  <a:tcPr/>
-                </a:tc>
-              </a:tr>
-              <a:tr h="182880">
-                <a:tc>
-                  <a:txBody>
-                    <a:bodyPr/>
-                    <a:lstStyle/>
-                    <a:p>
-                      <a:r>
-                        <a:rPr sz="1200"/>
-                        <a:t>2</a:t>
-                      </a:r>
-                    </a:p>
-                  </a:txBody>
-                  <a:tcPr/>
-                </a:tc>
-                <a:tc>
-                  <a:txBody>
-                    <a:bodyPr/>
-                    <a:lstStyle/>
-                    <a:p>
-                      <a:r>
-                        <a:rPr sz="1200"/>
-                        <a:t>3</a:t>
-                      </a:r>
-                    </a:p>
-                  </a:txBody>
-                  <a:tcPr/>
-                </a:tc>
-                <a:tc>
-                  <a:txBody>
-                    <a:bodyPr/>
-                    <a:lstStyle/>
-                    <a:p>
-                      <a:r>
-                        <a:rPr sz="1200"/>
-                        <a:t>0</a:t>
-                      </a:r>
-                    </a:p>
-                  </a:txBody>
-                  <a:tcPr/>
-                </a:tc>
-                <a:tc>
-                  <a:txBody>
-                    <a:bodyPr/>
-                    <a:lstStyle/>
-                    <a:p>
-                      <a:r>
-                        <a:rPr sz="1200"/>
-                        <a:t>0</a:t>
-                      </a:r>
-                    </a:p>
-                  </a:txBody>
-                  <a:tcPr/>
-                </a:tc>
-                <a:tc>
-                  <a:txBody>
-                    <a:bodyPr/>
-                    <a:lstStyle/>
-                    <a:p>
-                      <a:r>
-                        <a:rPr sz="1200"/>
-                        <a:t>5</a:t>
-                      </a:r>
-                    </a:p>
-                  </a:txBody>
-                  <a:tcPr/>
-                </a:tc>
-                <a:tc>
-                  <a:txBody>
-                    <a:bodyPr/>
-                    <a:lstStyle/>
-                    <a:p>
-                      <a:r>
-                        <a:rPr sz="1200"/>
-                        <a:t>3</a:t>
-                      </a:r>
-                    </a:p>
-                  </a:txBody>
-                  <a:tcPr/>
-                </a:tc>
-                <a:tc>
-                  <a:txBody>
-                    <a:bodyPr/>
-                    <a:lstStyle/>
-                    <a:p>
-                      <a:r>
-                        <a:rPr sz="1200"/>
-                        <a:t>13</a:t>
-                      </a:r>
-                    </a:p>
-                  </a:txBody>
-                  <a:tcPr/>
-                </a:tc>
-              </a:tr>
-            </a:tbl>
-          </a:graphicData>
-        </a:graphic>
-      </p:graphicFrame>
-      <p:pic>
-        <p:nvPicPr>
-          <p:cNvPr id="4" name="Picture 3" descr="Novatek_SoCMAG272QP_X50.png"/>
+          <p:cNvPr id="4" name="Picture 3" descr="Realtek_SoCFO27Q5P.png"/>
           <p:cNvPicPr>
             <a:picLocks noChangeAspect="1"/>
           </p:cNvPicPr>

</xml_diff>